<commit_message>
Updated presentation reflecting heatmaps
</commit_message>
<xml_diff>
--- a/Cleaning/Data Analytics ProjectPres_LP_review.pptx
+++ b/Cleaning/Data Analytics ProjectPres_LP_review.pptx
@@ -11,19 +11,17 @@
     <p:sldId id="270" r:id="rId5"/>
     <p:sldId id="271" r:id="rId6"/>
     <p:sldId id="274" r:id="rId7"/>
-    <p:sldId id="278" r:id="rId8"/>
-    <p:sldId id="280" r:id="rId9"/>
-    <p:sldId id="272" r:id="rId10"/>
-    <p:sldId id="273" r:id="rId11"/>
-    <p:sldId id="281" r:id="rId12"/>
-    <p:sldId id="282" r:id="rId13"/>
-    <p:sldId id="283" r:id="rId14"/>
-    <p:sldId id="284" r:id="rId15"/>
-    <p:sldId id="286" r:id="rId16"/>
-    <p:sldId id="287" r:id="rId17"/>
-    <p:sldId id="275" r:id="rId18"/>
-    <p:sldId id="276" r:id="rId19"/>
-    <p:sldId id="277" r:id="rId20"/>
+    <p:sldId id="288" r:id="rId8"/>
+    <p:sldId id="272" r:id="rId9"/>
+    <p:sldId id="273" r:id="rId10"/>
+    <p:sldId id="281" r:id="rId11"/>
+    <p:sldId id="283" r:id="rId12"/>
+    <p:sldId id="284" r:id="rId13"/>
+    <p:sldId id="286" r:id="rId14"/>
+    <p:sldId id="287" r:id="rId15"/>
+    <p:sldId id="275" r:id="rId16"/>
+    <p:sldId id="276" r:id="rId17"/>
+    <p:sldId id="277" r:id="rId18"/>
   </p:sldIdLst>
   <p:sldSz cx="12192000" cy="6858000"/>
   <p:notesSz cx="6858000" cy="9144000"/>
@@ -145,17 +143,8 @@
 <file path=ppt/comments/comment1.xml><?xml version="1.0" encoding="utf-8"?>
 <p:cmLst xmlns:a="http://schemas.openxmlformats.org/drawingml/2006/main" xmlns:r="http://schemas.openxmlformats.org/officeDocument/2006/relationships" xmlns:p="http://schemas.openxmlformats.org/presentationml/2006/main">
   <p:cm authorId="1" dt="2021-02-11T16:14:01.779" idx="3">
-    <p:pos x="5357" y="1192"/>
+    <p:pos x="5090" y="1248"/>
     <p:text>Jimmy to confirm</p:text>
-    <p:extLst>
-      <p:ext uri="{C676402C-5697-4E1C-873F-D02D1690AC5C}">
-        <p15:threadingInfo xmlns:p15="http://schemas.microsoft.com/office/powerpoint/2012/main" timeZoneBias="300"/>
-      </p:ext>
-    </p:extLst>
-  </p:cm>
-  <p:cm authorId="1" dt="2021-02-11T16:14:14.925" idx="4">
-    <p:pos x="5996" y="3226"/>
-    <p:text>Zehra to confirm</p:text>
     <p:extLst>
       <p:ext uri="{C676402C-5697-4E1C-873F-D02D1690AC5C}">
         <p15:threadingInfo xmlns:p15="http://schemas.microsoft.com/office/powerpoint/2012/main" timeZoneBias="300"/>
@@ -168,7 +157,7 @@
 <file path=ppt/comments/comment2.xml><?xml version="1.0" encoding="utf-8"?>
 <p:cmLst xmlns:a="http://schemas.openxmlformats.org/drawingml/2006/main" xmlns:r="http://schemas.openxmlformats.org/officeDocument/2006/relationships" xmlns:p="http://schemas.openxmlformats.org/presentationml/2006/main">
   <p:cm authorId="1" dt="2021-02-11T16:54:22.400" idx="5">
-    <p:pos x="7079" y="1169"/>
+    <p:pos x="2218" y="916"/>
     <p:text>Jimmy to confirm language here</p:text>
     <p:extLst>
       <p:ext uri="{C676402C-5697-4E1C-873F-D02D1690AC5C}">
@@ -365,7 +354,7 @@
           <a:p>
             <a:fld id="{9184DA70-C731-4C70-880D-CCD4705E623C}" type="datetime1">
               <a:rPr lang="en-US" smtClean="0"/>
-              <a:t>2/11/2021</a:t>
+              <a:t>2/12/2021</a:t>
             </a:fld>
             <a:endParaRPr lang="en-US" dirty="0"/>
           </a:p>
@@ -640,7 +629,7 @@
           <a:p>
             <a:fld id="{62D6E202-B606-4609-B914-27C9371A1F6D}" type="datetime1">
               <a:rPr lang="en-US" smtClean="0"/>
-              <a:t>2/11/2021</a:t>
+              <a:t>2/12/2021</a:t>
             </a:fld>
             <a:endParaRPr lang="en-US" dirty="0"/>
           </a:p>
@@ -835,7 +824,7 @@
           <a:p>
             <a:fld id="{62D6E202-B606-4609-B914-27C9371A1F6D}" type="datetime1">
               <a:rPr lang="en-US" smtClean="0"/>
-              <a:t>2/11/2021</a:t>
+              <a:t>2/12/2021</a:t>
             </a:fld>
             <a:endParaRPr lang="en-US" dirty="0"/>
           </a:p>
@@ -1109,7 +1098,7 @@
           <a:p>
             <a:fld id="{62D6E202-B606-4609-B914-27C9371A1F6D}" type="datetime1">
               <a:rPr lang="en-US" smtClean="0"/>
-              <a:t>2/11/2021</a:t>
+              <a:t>2/12/2021</a:t>
             </a:fld>
             <a:endParaRPr lang="en-US" dirty="0"/>
           </a:p>
@@ -1451,7 +1440,7 @@
           <a:p>
             <a:fld id="{62D6E202-B606-4609-B914-27C9371A1F6D}" type="datetime1">
               <a:rPr lang="en-US" smtClean="0"/>
-              <a:t>2/11/2021</a:t>
+              <a:t>2/12/2021</a:t>
             </a:fld>
             <a:endParaRPr lang="en-US" dirty="0"/>
           </a:p>
@@ -2075,7 +2064,7 @@
           <a:p>
             <a:fld id="{62D6E202-B606-4609-B914-27C9371A1F6D}" type="datetime1">
               <a:rPr lang="en-US" smtClean="0"/>
-              <a:t>2/11/2021</a:t>
+              <a:t>2/12/2021</a:t>
             </a:fld>
             <a:endParaRPr lang="en-US" dirty="0"/>
           </a:p>
@@ -2936,7 +2925,7 @@
           <a:p>
             <a:fld id="{62D6E202-B606-4609-B914-27C9371A1F6D}" type="datetime1">
               <a:rPr lang="en-US" smtClean="0"/>
-              <a:t>2/11/2021</a:t>
+              <a:t>2/12/2021</a:t>
             </a:fld>
             <a:endParaRPr lang="en-US" dirty="0"/>
           </a:p>
@@ -3107,7 +3096,7 @@
           <a:p>
             <a:fld id="{B612A279-0833-481D-8C56-F67FD0AC6C50}" type="datetime1">
               <a:rPr lang="en-US" smtClean="0"/>
-              <a:t>2/11/2021</a:t>
+              <a:t>2/12/2021</a:t>
             </a:fld>
             <a:endParaRPr lang="en-US" dirty="0"/>
           </a:p>
@@ -3287,7 +3276,7 @@
           <a:p>
             <a:fld id="{6587DA83-5663-4C9C-B9AA-0B40A3DAFF81}" type="datetime1">
               <a:rPr lang="en-US" smtClean="0"/>
-              <a:t>2/11/2021</a:t>
+              <a:t>2/12/2021</a:t>
             </a:fld>
             <a:endParaRPr lang="en-US" dirty="0"/>
           </a:p>
@@ -3457,7 +3446,7 @@
           <a:p>
             <a:fld id="{4BE1D723-8F53-4F53-90B0-1982A396982E}" type="datetime1">
               <a:rPr lang="en-US" smtClean="0"/>
-              <a:t>2/11/2021</a:t>
+              <a:t>2/12/2021</a:t>
             </a:fld>
             <a:endParaRPr lang="en-US" dirty="0"/>
           </a:p>
@@ -3704,7 +3693,7 @@
           <a:p>
             <a:fld id="{97669AF7-7BEB-44E4-9852-375E34362B5B}" type="datetime1">
               <a:rPr lang="en-US" smtClean="0"/>
-              <a:t>2/11/2021</a:t>
+              <a:t>2/12/2021</a:t>
             </a:fld>
             <a:endParaRPr lang="en-US" dirty="0"/>
           </a:p>
@@ -3996,7 +3985,7 @@
           <a:p>
             <a:fld id="{BAAAC38D-0552-4C82-B593-E6124DFADBE2}" type="datetime1">
               <a:rPr lang="en-US" smtClean="0"/>
-              <a:t>2/11/2021</a:t>
+              <a:t>2/12/2021</a:t>
             </a:fld>
             <a:endParaRPr lang="en-US" dirty="0"/>
           </a:p>
@@ -4440,7 +4429,7 @@
           <a:p>
             <a:fld id="{D9DF0F1C-5577-4ACB-BB62-DF8F3C494C7E}" type="datetime1">
               <a:rPr lang="en-US" smtClean="0"/>
-              <a:t>2/11/2021</a:t>
+              <a:t>2/12/2021</a:t>
             </a:fld>
             <a:endParaRPr lang="en-US" dirty="0"/>
           </a:p>
@@ -4558,7 +4547,7 @@
           <a:p>
             <a:fld id="{1775B394-D9F9-4F0C-B15D-605F45CB9E9F}" type="datetime1">
               <a:rPr lang="en-US" smtClean="0"/>
-              <a:t>2/11/2021</a:t>
+              <a:t>2/12/2021</a:t>
             </a:fld>
             <a:endParaRPr lang="en-US" dirty="0"/>
           </a:p>
@@ -4653,7 +4642,7 @@
           <a:p>
             <a:fld id="{39667345-2558-425A-8533-9BFDBCE15005}" type="datetime1">
               <a:rPr lang="en-US" smtClean="0"/>
-              <a:t>2/11/2021</a:t>
+              <a:t>2/12/2021</a:t>
             </a:fld>
             <a:endParaRPr lang="en-US" dirty="0"/>
           </a:p>
@@ -4932,7 +4921,7 @@
           <a:p>
             <a:fld id="{92BEA474-078D-4E9B-9B14-09A87B19DC46}" type="datetime1">
               <a:rPr lang="en-US" smtClean="0"/>
-              <a:t>2/11/2021</a:t>
+              <a:t>2/12/2021</a:t>
             </a:fld>
             <a:endParaRPr lang="en-US" dirty="0"/>
           </a:p>
@@ -5208,7 +5197,7 @@
           <a:p>
             <a:fld id="{4907D986-8816-4272-A432-0437A28A9828}" type="datetime1">
               <a:rPr lang="en-US" smtClean="0"/>
-              <a:t>2/11/2021</a:t>
+              <a:t>2/12/2021</a:t>
             </a:fld>
             <a:endParaRPr lang="en-US" dirty="0"/>
           </a:p>
@@ -5638,7 +5627,7 @@
           <a:p>
             <a:fld id="{62D6E202-B606-4609-B914-27C9371A1F6D}" type="datetime1">
               <a:rPr lang="en-US" smtClean="0"/>
-              <a:t>2/11/2021</a:t>
+              <a:t>2/12/2021</a:t>
             </a:fld>
             <a:endParaRPr lang="en-US" dirty="0"/>
           </a:p>
@@ -6611,7 +6600,7 @@
         <p:spPr>
           <a:xfrm>
             <a:off x="534152" y="387412"/>
-            <a:ext cx="9588044" cy="892552"/>
+            <a:ext cx="9724970" cy="646331"/>
           </a:xfrm>
           <a:prstGeom prst="rect">
             <a:avLst/>
@@ -6635,17 +6624,146 @@
             </a:r>
             <a:r>
               <a:rPr lang="en-US" sz="1600" b="1" dirty="0"/>
-              <a:t>Twitter Activity vs. Covid-19 Progression: Global Analysis </a:t>
-            </a:r>
-          </a:p>
-        </p:txBody>
-      </p:sp>
-      <p:sp>
-        <p:nvSpPr>
-          <p:cNvPr id="9" name="TextBox 8">
+              <a:t>North Carolina Twitter Activity vs. Covid-19 Progression</a:t>
+            </a:r>
+          </a:p>
+        </p:txBody>
+      </p:sp>
+      <p:sp>
+        <p:nvSpPr>
+          <p:cNvPr id="11" name="Rectangle 10">
             <a:extLst>
               <a:ext uri="{FF2B5EF4-FFF2-40B4-BE49-F238E27FC236}">
-                <a16:creationId xmlns:a16="http://schemas.microsoft.com/office/drawing/2014/main" id="{ED4AF83A-ACBF-4FE0-8922-5FF013FE6807}"/>
+                <a16:creationId xmlns:a16="http://schemas.microsoft.com/office/drawing/2014/main" id="{28BEF27B-97E2-4C5B-B4D9-D43E776C55E5}"/>
+              </a:ext>
+            </a:extLst>
+          </p:cNvPr>
+          <p:cNvSpPr/>
+          <p:nvPr/>
+        </p:nvSpPr>
+        <p:spPr>
+          <a:xfrm>
+            <a:off x="7441324" y="1420271"/>
+            <a:ext cx="4424679" cy="5116029"/>
+          </a:xfrm>
+          <a:prstGeom prst="rect">
+            <a:avLst/>
+          </a:prstGeom>
+          <a:solidFill>
+            <a:schemeClr val="tx1"/>
+          </a:solidFill>
+          <a:ln>
+            <a:noFill/>
+          </a:ln>
+        </p:spPr>
+        <p:style>
+          <a:lnRef idx="2">
+            <a:schemeClr val="accent1">
+              <a:shade val="50000"/>
+            </a:schemeClr>
+          </a:lnRef>
+          <a:fillRef idx="1">
+            <a:schemeClr val="accent1"/>
+          </a:fillRef>
+          <a:effectRef idx="0">
+            <a:schemeClr val="accent1"/>
+          </a:effectRef>
+          <a:fontRef idx="minor">
+            <a:schemeClr val="lt1"/>
+          </a:fontRef>
+        </p:style>
+        <p:txBody>
+          <a:bodyPr rtlCol="0" anchor="ctr"/>
+          <a:lstStyle/>
+          <a:p>
+            <a:pPr algn="ctr"/>
+            <a:endParaRPr lang="en-US"/>
+          </a:p>
+        </p:txBody>
+      </p:sp>
+      <p:pic>
+        <p:nvPicPr>
+          <p:cNvPr id="4" name="Picture 3">
+            <a:extLst>
+              <a:ext uri="{FF2B5EF4-FFF2-40B4-BE49-F238E27FC236}">
+                <a16:creationId xmlns:a16="http://schemas.microsoft.com/office/drawing/2014/main" id="{10B66BEB-6FB5-4D0E-B734-DB46106869F5}"/>
+              </a:ext>
+            </a:extLst>
+          </p:cNvPr>
+          <p:cNvPicPr>
+            <a:picLocks noChangeAspect="1"/>
+          </p:cNvPicPr>
+          <p:nvPr/>
+        </p:nvPicPr>
+        <p:blipFill>
+          <a:blip r:embed="rId2"/>
+          <a:stretch>
+            <a:fillRect/>
+          </a:stretch>
+        </p:blipFill>
+        <p:spPr>
+          <a:xfrm>
+            <a:off x="7655644" y="4112587"/>
+            <a:ext cx="4002204" cy="2358001"/>
+          </a:xfrm>
+          <a:prstGeom prst="rect">
+            <a:avLst/>
+          </a:prstGeom>
+        </p:spPr>
+      </p:pic>
+      <p:pic>
+        <p:nvPicPr>
+          <p:cNvPr id="18" name="Picture 2">
+            <a:extLst>
+              <a:ext uri="{FF2B5EF4-FFF2-40B4-BE49-F238E27FC236}">
+                <a16:creationId xmlns:a16="http://schemas.microsoft.com/office/drawing/2014/main" id="{A6A9EB57-C7C6-43C0-9465-349E43C891BD}"/>
+              </a:ext>
+            </a:extLst>
+          </p:cNvPr>
+          <p:cNvPicPr>
+            <a:picLocks noChangeAspect="1" noChangeArrowheads="1"/>
+          </p:cNvPicPr>
+          <p:nvPr/>
+        </p:nvPicPr>
+        <p:blipFill>
+          <a:blip r:embed="rId3">
+            <a:extLst>
+              <a:ext uri="{28A0092B-C50C-407E-A947-70E740481C1C}">
+                <a14:useLocalDpi xmlns:a14="http://schemas.microsoft.com/office/drawing/2010/main" val="0"/>
+              </a:ext>
+            </a:extLst>
+          </a:blip>
+          <a:stretch>
+            <a:fillRect/>
+          </a:stretch>
+        </p:blipFill>
+        <p:spPr bwMode="auto">
+          <a:xfrm>
+            <a:off x="7655644" y="1462854"/>
+            <a:ext cx="4002204" cy="2715445"/>
+          </a:xfrm>
+          <a:prstGeom prst="rect">
+            <a:avLst/>
+          </a:prstGeom>
+          <a:noFill/>
+          <a:effectLst/>
+          <a:extLst>
+            <a:ext uri="{909E8E84-426E-40DD-AFC4-6F175D3DCCD1}">
+              <a14:hiddenFill xmlns:a14="http://schemas.microsoft.com/office/drawing/2010/main">
+                <a:solidFill>
+                  <a:srgbClr val="FFFFFF"/>
+                </a:solidFill>
+              </a14:hiddenFill>
+            </a:ext>
+          </a:extLst>
+        </p:spPr>
+      </p:pic>
+      <p:sp>
+        <p:nvSpPr>
+          <p:cNvPr id="12" name="TextBox 11">
+            <a:extLst>
+              <a:ext uri="{FF2B5EF4-FFF2-40B4-BE49-F238E27FC236}">
+                <a16:creationId xmlns:a16="http://schemas.microsoft.com/office/drawing/2014/main" id="{1D84C429-5818-4A3F-BCAC-63A138FF1155}"/>
               </a:ext>
             </a:extLst>
           </p:cNvPr>
@@ -6654,8 +6772,8 @@
         </p:nvSpPr>
         <p:spPr>
           <a:xfrm>
-            <a:off x="451094" y="1322018"/>
-            <a:ext cx="10196623" cy="338554"/>
+            <a:off x="534152" y="1081718"/>
+            <a:ext cx="3799242" cy="338554"/>
           </a:xfrm>
           <a:prstGeom prst="rect">
             <a:avLst/>
@@ -6670,17 +6788,47 @@
           <a:p>
             <a:r>
               <a:rPr lang="en-US" sz="1600" b="1" dirty="0"/>
-              <a:t>Observations:</a:t>
-            </a:r>
-          </a:p>
-        </p:txBody>
-      </p:sp>
-      <p:sp>
-        <p:nvSpPr>
-          <p:cNvPr id="5" name="TextBox 4">
+              <a:t>March Twitter Activity:</a:t>
+            </a:r>
+          </a:p>
+        </p:txBody>
+      </p:sp>
+      <p:pic>
+        <p:nvPicPr>
+          <p:cNvPr id="13" name="Picture 12">
             <a:extLst>
               <a:ext uri="{FF2B5EF4-FFF2-40B4-BE49-F238E27FC236}">
-                <a16:creationId xmlns:a16="http://schemas.microsoft.com/office/drawing/2014/main" id="{BCCA9899-05A3-4774-B7EF-C5CDC8A001A5}"/>
+                <a16:creationId xmlns:a16="http://schemas.microsoft.com/office/drawing/2014/main" id="{A9F81B7D-6892-4B7D-8C37-4A96C8540443}"/>
+              </a:ext>
+            </a:extLst>
+          </p:cNvPr>
+          <p:cNvPicPr>
+            <a:picLocks noChangeAspect="1"/>
+          </p:cNvPicPr>
+          <p:nvPr/>
+        </p:nvPicPr>
+        <p:blipFill>
+          <a:blip r:embed="rId4"/>
+          <a:stretch>
+            <a:fillRect/>
+          </a:stretch>
+        </p:blipFill>
+        <p:spPr>
+          <a:xfrm>
+            <a:off x="534152" y="1426207"/>
+            <a:ext cx="6067958" cy="2264638"/>
+          </a:xfrm>
+          <a:prstGeom prst="rect">
+            <a:avLst/>
+          </a:prstGeom>
+        </p:spPr>
+      </p:pic>
+      <p:sp>
+        <p:nvSpPr>
+          <p:cNvPr id="14" name="TextBox 13">
+            <a:extLst>
+              <a:ext uri="{FF2B5EF4-FFF2-40B4-BE49-F238E27FC236}">
+                <a16:creationId xmlns:a16="http://schemas.microsoft.com/office/drawing/2014/main" id="{A518974D-C573-4F58-BA65-FE27FA551F1C}"/>
               </a:ext>
             </a:extLst>
           </p:cNvPr>
@@ -6689,8 +6837,8 @@
         </p:nvSpPr>
         <p:spPr>
           <a:xfrm>
-            <a:off x="621792" y="1792384"/>
-            <a:ext cx="10625328" cy="4678204"/>
+            <a:off x="464641" y="3744755"/>
+            <a:ext cx="3799242" cy="338554"/>
           </a:xfrm>
           <a:prstGeom prst="rect">
             <a:avLst/>
@@ -6703,137 +6851,47 @@
           </a:bodyPr>
           <a:lstStyle/>
           <a:p>
-            <a:pPr marL="342900" indent="-342900">
-              <a:buAutoNum type="arabicParenR"/>
-            </a:pPr>
-            <a:r>
-              <a:rPr lang="en-US" sz="1400" dirty="0"/>
-              <a:t>During the early stages of the pandemic, Twitter data globally did not see a steady increase in original tweets as expected.  Instead, </a:t>
-            </a:r>
-            <a:r>
-              <a:rPr lang="en-US" sz="1400" dirty="0">
-                <a:effectLst/>
-              </a:rPr>
-              <a:t>higher numbers of original tweets occurred on days when there was major world headlines.  Clear examples occurred on January 31</a:t>
-            </a:r>
-            <a:r>
-              <a:rPr lang="en-US" sz="1400" baseline="30000" dirty="0">
-                <a:effectLst/>
-              </a:rPr>
-              <a:t>st</a:t>
-            </a:r>
-            <a:r>
-              <a:rPr lang="en-US" sz="1400" dirty="0">
-                <a:effectLst/>
-              </a:rPr>
-              <a:t> when the US announced travel restrictions for visitors returning from China and when the first quarantines were initiated.  Similar headline grabbing announcements occurred on February 9</a:t>
-            </a:r>
-            <a:r>
-              <a:rPr lang="en-US" sz="1400" baseline="30000" dirty="0">
-                <a:effectLst/>
-              </a:rPr>
-              <a:t>th</a:t>
-            </a:r>
-            <a:r>
-              <a:rPr lang="en-US" sz="1400" dirty="0">
-                <a:effectLst/>
-              </a:rPr>
-              <a:t>, 2020 (China investing10bn to fight the virus) and on February 21</a:t>
-            </a:r>
-            <a:r>
-              <a:rPr lang="en-US" sz="1400" baseline="30000" dirty="0">
-                <a:effectLst/>
-              </a:rPr>
-              <a:t>st</a:t>
-            </a:r>
-            <a:r>
-              <a:rPr lang="en-US" sz="1400" dirty="0">
-                <a:effectLst/>
-              </a:rPr>
-              <a:t> (WHO announced that Covid-19 was officially a pandemic). </a:t>
-            </a:r>
-          </a:p>
-          <a:p>
-            <a:r>
-              <a:rPr lang="en-US" sz="1400" dirty="0"/>
-              <a:t>	</a:t>
-            </a:r>
-          </a:p>
-          <a:p>
-            <a:r>
-              <a:rPr lang="en-US" sz="1400" dirty="0">
-                <a:effectLst/>
-              </a:rPr>
-              <a:t>		News cycles have significant impact on original tweets rather than sustained but increasing information such 		as what was experienced in the early part of the Covid-19 pandemic. </a:t>
-            </a:r>
-          </a:p>
-          <a:p>
-            <a:endParaRPr lang="en-US" sz="1400" dirty="0">
-              <a:effectLst/>
-            </a:endParaRPr>
-          </a:p>
-          <a:p>
-            <a:pPr marL="342900" indent="-342900">
-              <a:buAutoNum type="arabicParenR"/>
-            </a:pPr>
-            <a:endParaRPr lang="en-US" sz="1400" dirty="0"/>
-          </a:p>
-          <a:p>
-            <a:pPr marL="342900" indent="-342900">
-              <a:buAutoNum type="arabicParenR"/>
-            </a:pPr>
-            <a:endParaRPr lang="en-US" sz="1400" dirty="0">
-              <a:effectLst/>
-            </a:endParaRPr>
-          </a:p>
-          <a:p>
-            <a:r>
-              <a:rPr lang="en-US" sz="1400" dirty="0">
-                <a:effectLst/>
-              </a:rPr>
-              <a:t>2)	“Likes” and “Retweets” differed slightly.  There were still peaks on days which correlated to major headlines, but as 	the virus progressed,  “Likes” and “Retweets” reflected more stable forward progression as expected.  Also, the 	comparison between “Likes” and “Retweets” reflects that Twitter users are more inclined to like rather than retweet. </a:t>
-            </a:r>
-          </a:p>
-          <a:p>
-            <a:pPr marL="342900" indent="-342900">
-              <a:buFontTx/>
-              <a:buAutoNum type="arabicParenR"/>
-            </a:pPr>
-            <a:endParaRPr lang="en-US" sz="1400" dirty="0"/>
-          </a:p>
-          <a:p>
-            <a:r>
-              <a:rPr lang="en-US" sz="1400" dirty="0">
-                <a:effectLst/>
-              </a:rPr>
-              <a:t>		As awareness of a topic, like Covid-19, grows, Twitter users are more likely to be involved in that topic.  This 			corresponds to more tweet “Likes” and “Retweets.”</a:t>
-            </a:r>
-          </a:p>
-          <a:p>
-            <a:r>
-              <a:rPr lang="en-US" sz="1400" dirty="0">
-                <a:effectLst/>
-              </a:rPr>
-              <a:t> </a:t>
-            </a:r>
-          </a:p>
-          <a:p>
-            <a:pPr marL="342900" indent="-342900">
-              <a:buAutoNum type="arabicParenR"/>
-            </a:pPr>
-            <a:endParaRPr lang="en-US" sz="1400" dirty="0">
-              <a:effectLst/>
-            </a:endParaRPr>
-          </a:p>
-          <a:p>
-            <a:endParaRPr lang="en-US" dirty="0"/>
-          </a:p>
-        </p:txBody>
-      </p:sp>
+            <a:r>
+              <a:rPr lang="en-US" sz="1600" b="1" dirty="0"/>
+              <a:t>April Twitter Activity:</a:t>
+            </a:r>
+          </a:p>
+        </p:txBody>
+      </p:sp>
+      <p:pic>
+        <p:nvPicPr>
+          <p:cNvPr id="15" name="Picture 14">
+            <a:extLst>
+              <a:ext uri="{FF2B5EF4-FFF2-40B4-BE49-F238E27FC236}">
+                <a16:creationId xmlns:a16="http://schemas.microsoft.com/office/drawing/2014/main" id="{0C5ED0A0-263A-43C5-B7BD-D60FD3213A08}"/>
+              </a:ext>
+            </a:extLst>
+          </p:cNvPr>
+          <p:cNvPicPr>
+            <a:picLocks noChangeAspect="1"/>
+          </p:cNvPicPr>
+          <p:nvPr/>
+        </p:nvPicPr>
+        <p:blipFill>
+          <a:blip r:embed="rId4"/>
+          <a:stretch>
+            <a:fillRect/>
+          </a:stretch>
+        </p:blipFill>
+        <p:spPr>
+          <a:xfrm>
+            <a:off x="534151" y="4188767"/>
+            <a:ext cx="6067957" cy="2347533"/>
+          </a:xfrm>
+          <a:prstGeom prst="rect">
+            <a:avLst/>
+          </a:prstGeom>
+        </p:spPr>
+      </p:pic>
     </p:spTree>
     <p:extLst>
       <p:ext uri="{BB962C8B-B14F-4D97-AF65-F5344CB8AC3E}">
-        <p14:creationId xmlns:p14="http://schemas.microsoft.com/office/powerpoint/2010/main" val="1386029775"/>
+        <p14:creationId xmlns:p14="http://schemas.microsoft.com/office/powerpoint/2010/main" val="1045495254"/>
       </p:ext>
     </p:extLst>
   </p:cSld>
@@ -6875,7 +6933,7 @@
         <p:spPr>
           <a:xfrm>
             <a:off x="534152" y="387412"/>
-            <a:ext cx="9588044" cy="646331"/>
+            <a:ext cx="9925692" cy="646331"/>
           </a:xfrm>
           <a:prstGeom prst="rect">
             <a:avLst/>
@@ -6899,327 +6957,17 @@
             </a:r>
             <a:r>
               <a:rPr lang="en-US" sz="1600" b="1" dirty="0"/>
-              <a:t>Covid-19 Rise in North Carolina vs. Twitter Geocoding</a:t>
-            </a:r>
-          </a:p>
-        </p:txBody>
-      </p:sp>
-      <p:sp>
-        <p:nvSpPr>
-          <p:cNvPr id="6" name="Rectangle 5">
+              <a:t>North Carolina Twitter Activity vs. Covid-19 Progression</a:t>
+            </a:r>
+          </a:p>
+        </p:txBody>
+      </p:sp>
+      <p:sp>
+        <p:nvSpPr>
+          <p:cNvPr id="6" name="TextBox 5">
             <a:extLst>
               <a:ext uri="{FF2B5EF4-FFF2-40B4-BE49-F238E27FC236}">
-                <a16:creationId xmlns:a16="http://schemas.microsoft.com/office/drawing/2014/main" id="{20D02226-5A5F-49CD-B0EF-F0194D97CA2A}"/>
-              </a:ext>
-            </a:extLst>
-          </p:cNvPr>
-          <p:cNvSpPr/>
-          <p:nvPr/>
-        </p:nvSpPr>
-        <p:spPr>
-          <a:xfrm>
-            <a:off x="4185528" y="1120707"/>
-            <a:ext cx="3872390" cy="5493271"/>
-          </a:xfrm>
-          <a:prstGeom prst="rect">
-            <a:avLst/>
-          </a:prstGeom>
-          <a:solidFill>
-            <a:schemeClr val="tx1"/>
-          </a:solidFill>
-          <a:ln>
-            <a:noFill/>
-          </a:ln>
-        </p:spPr>
-        <p:style>
-          <a:lnRef idx="2">
-            <a:schemeClr val="accent1">
-              <a:shade val="50000"/>
-            </a:schemeClr>
-          </a:lnRef>
-          <a:fillRef idx="1">
-            <a:schemeClr val="accent1"/>
-          </a:fillRef>
-          <a:effectRef idx="0">
-            <a:schemeClr val="accent1"/>
-          </a:effectRef>
-          <a:fontRef idx="minor">
-            <a:schemeClr val="lt1"/>
-          </a:fontRef>
-        </p:style>
-        <p:txBody>
-          <a:bodyPr rtlCol="0" anchor="ctr"/>
-          <a:lstStyle/>
-          <a:p>
-            <a:pPr algn="ctr"/>
-            <a:endParaRPr lang="en-US"/>
-          </a:p>
-        </p:txBody>
-      </p:sp>
-      <p:pic>
-        <p:nvPicPr>
-          <p:cNvPr id="9" name="Picture 2">
-            <a:extLst>
-              <a:ext uri="{FF2B5EF4-FFF2-40B4-BE49-F238E27FC236}">
-                <a16:creationId xmlns:a16="http://schemas.microsoft.com/office/drawing/2014/main" id="{F0D47ED2-AB1D-44A8-8C2A-1AC3F166D463}"/>
-              </a:ext>
-            </a:extLst>
-          </p:cNvPr>
-          <p:cNvPicPr>
-            <a:picLocks noChangeAspect="1" noChangeArrowheads="1"/>
-          </p:cNvPicPr>
-          <p:nvPr/>
-        </p:nvPicPr>
-        <p:blipFill>
-          <a:blip r:embed="rId2">
-            <a:extLst>
-              <a:ext uri="{28A0092B-C50C-407E-A947-70E740481C1C}">
-                <a14:useLocalDpi xmlns:a14="http://schemas.microsoft.com/office/drawing/2010/main" val="0"/>
-              </a:ext>
-            </a:extLst>
-          </a:blip>
-          <a:stretch>
-            <a:fillRect/>
-          </a:stretch>
-        </p:blipFill>
-        <p:spPr bwMode="auto">
-          <a:xfrm>
-            <a:off x="4185528" y="1187690"/>
-            <a:ext cx="3463255" cy="2810936"/>
-          </a:xfrm>
-          <a:prstGeom prst="rect">
-            <a:avLst/>
-          </a:prstGeom>
-          <a:noFill/>
-          <a:effectLst/>
-          <a:extLst>
-            <a:ext uri="{909E8E84-426E-40DD-AFC4-6F175D3DCCD1}">
-              <a14:hiddenFill xmlns:a14="http://schemas.microsoft.com/office/drawing/2010/main">
-                <a:solidFill>
-                  <a:srgbClr val="FFFFFF"/>
-                </a:solidFill>
-              </a14:hiddenFill>
-            </a:ext>
-          </a:extLst>
-        </p:spPr>
-      </p:pic>
-      <p:sp>
-        <p:nvSpPr>
-          <p:cNvPr id="11" name="Rectangle 10">
-            <a:extLst>
-              <a:ext uri="{FF2B5EF4-FFF2-40B4-BE49-F238E27FC236}">
-                <a16:creationId xmlns:a16="http://schemas.microsoft.com/office/drawing/2014/main" id="{28BEF27B-97E2-4C5B-B4D9-D43E776C55E5}"/>
-              </a:ext>
-            </a:extLst>
-          </p:cNvPr>
-          <p:cNvSpPr/>
-          <p:nvPr/>
-        </p:nvSpPr>
-        <p:spPr>
-          <a:xfrm>
-            <a:off x="173916" y="1124385"/>
-            <a:ext cx="3872390" cy="5493271"/>
-          </a:xfrm>
-          <a:prstGeom prst="rect">
-            <a:avLst/>
-          </a:prstGeom>
-          <a:solidFill>
-            <a:schemeClr val="tx1"/>
-          </a:solidFill>
-          <a:ln>
-            <a:noFill/>
-          </a:ln>
-        </p:spPr>
-        <p:style>
-          <a:lnRef idx="2">
-            <a:schemeClr val="accent1">
-              <a:shade val="50000"/>
-            </a:schemeClr>
-          </a:lnRef>
-          <a:fillRef idx="1">
-            <a:schemeClr val="accent1"/>
-          </a:fillRef>
-          <a:effectRef idx="0">
-            <a:schemeClr val="accent1"/>
-          </a:effectRef>
-          <a:fontRef idx="minor">
-            <a:schemeClr val="lt1"/>
-          </a:fontRef>
-        </p:style>
-        <p:txBody>
-          <a:bodyPr rtlCol="0" anchor="ctr"/>
-          <a:lstStyle/>
-          <a:p>
-            <a:pPr algn="ctr"/>
-            <a:endParaRPr lang="en-US"/>
-          </a:p>
-        </p:txBody>
-      </p:sp>
-      <p:pic>
-        <p:nvPicPr>
-          <p:cNvPr id="4" name="Picture 3">
-            <a:extLst>
-              <a:ext uri="{FF2B5EF4-FFF2-40B4-BE49-F238E27FC236}">
-                <a16:creationId xmlns:a16="http://schemas.microsoft.com/office/drawing/2014/main" id="{10B66BEB-6FB5-4D0E-B734-DB46106869F5}"/>
-              </a:ext>
-            </a:extLst>
-          </p:cNvPr>
-          <p:cNvPicPr>
-            <a:picLocks noChangeAspect="1"/>
-          </p:cNvPicPr>
-          <p:nvPr/>
-        </p:nvPicPr>
-        <p:blipFill>
-          <a:blip r:embed="rId3"/>
-          <a:stretch>
-            <a:fillRect/>
-          </a:stretch>
-        </p:blipFill>
-        <p:spPr>
-          <a:xfrm>
-            <a:off x="173916" y="4056346"/>
-            <a:ext cx="3614639" cy="2300786"/>
-          </a:xfrm>
-          <a:prstGeom prst="rect">
-            <a:avLst/>
-          </a:prstGeom>
-        </p:spPr>
-      </p:pic>
-      <p:pic>
-        <p:nvPicPr>
-          <p:cNvPr id="7" name="Picture 6">
-            <a:extLst>
-              <a:ext uri="{FF2B5EF4-FFF2-40B4-BE49-F238E27FC236}">
-                <a16:creationId xmlns:a16="http://schemas.microsoft.com/office/drawing/2014/main" id="{25F875D5-C263-4268-A1EB-CD1724F6B89C}"/>
-              </a:ext>
-            </a:extLst>
-          </p:cNvPr>
-          <p:cNvPicPr>
-            <a:picLocks noChangeAspect="1"/>
-          </p:cNvPicPr>
-          <p:nvPr/>
-        </p:nvPicPr>
-        <p:blipFill>
-          <a:blip r:embed="rId4"/>
-          <a:stretch>
-            <a:fillRect/>
-          </a:stretch>
-        </p:blipFill>
-        <p:spPr>
-          <a:xfrm>
-            <a:off x="4185528" y="4138487"/>
-            <a:ext cx="3587080" cy="2335629"/>
-          </a:xfrm>
-          <a:prstGeom prst="rect">
-            <a:avLst/>
-          </a:prstGeom>
-        </p:spPr>
-      </p:pic>
-      <p:pic>
-        <p:nvPicPr>
-          <p:cNvPr id="18" name="Picture 2">
-            <a:extLst>
-              <a:ext uri="{FF2B5EF4-FFF2-40B4-BE49-F238E27FC236}">
-                <a16:creationId xmlns:a16="http://schemas.microsoft.com/office/drawing/2014/main" id="{A6A9EB57-C7C6-43C0-9465-349E43C891BD}"/>
-              </a:ext>
-            </a:extLst>
-          </p:cNvPr>
-          <p:cNvPicPr>
-            <a:picLocks noChangeAspect="1" noChangeArrowheads="1"/>
-          </p:cNvPicPr>
-          <p:nvPr/>
-        </p:nvPicPr>
-        <p:blipFill>
-          <a:blip r:embed="rId5">
-            <a:extLst>
-              <a:ext uri="{28A0092B-C50C-407E-A947-70E740481C1C}">
-                <a14:useLocalDpi xmlns:a14="http://schemas.microsoft.com/office/drawing/2010/main" val="0"/>
-              </a:ext>
-            </a:extLst>
-          </a:blip>
-          <a:stretch>
-            <a:fillRect/>
-          </a:stretch>
-        </p:blipFill>
-        <p:spPr bwMode="auto">
-          <a:xfrm>
-            <a:off x="142468" y="1187690"/>
-            <a:ext cx="3805338" cy="2683330"/>
-          </a:xfrm>
-          <a:prstGeom prst="rect">
-            <a:avLst/>
-          </a:prstGeom>
-          <a:noFill/>
-          <a:effectLst/>
-          <a:extLst>
-            <a:ext uri="{909E8E84-426E-40DD-AFC4-6F175D3DCCD1}">
-              <a14:hiddenFill xmlns:a14="http://schemas.microsoft.com/office/drawing/2010/main">
-                <a:solidFill>
-                  <a:srgbClr val="FFFFFF"/>
-                </a:solidFill>
-              </a14:hiddenFill>
-            </a:ext>
-          </a:extLst>
-        </p:spPr>
-      </p:pic>
-      <p:sp>
-        <p:nvSpPr>
-          <p:cNvPr id="19" name="Rectangle 18">
-            <a:extLst>
-              <a:ext uri="{FF2B5EF4-FFF2-40B4-BE49-F238E27FC236}">
-                <a16:creationId xmlns:a16="http://schemas.microsoft.com/office/drawing/2014/main" id="{134C3444-5308-4F4D-B5FA-DEF00D07ED93}"/>
-              </a:ext>
-            </a:extLst>
-          </p:cNvPr>
-          <p:cNvSpPr/>
-          <p:nvPr/>
-        </p:nvSpPr>
-        <p:spPr>
-          <a:xfrm>
-            <a:off x="8197140" y="1120707"/>
-            <a:ext cx="3872390" cy="5493271"/>
-          </a:xfrm>
-          <a:prstGeom prst="rect">
-            <a:avLst/>
-          </a:prstGeom>
-          <a:solidFill>
-            <a:schemeClr val="tx1"/>
-          </a:solidFill>
-          <a:ln>
-            <a:noFill/>
-          </a:ln>
-        </p:spPr>
-        <p:style>
-          <a:lnRef idx="2">
-            <a:schemeClr val="accent1">
-              <a:shade val="50000"/>
-            </a:schemeClr>
-          </a:lnRef>
-          <a:fillRef idx="1">
-            <a:schemeClr val="accent1"/>
-          </a:fillRef>
-          <a:effectRef idx="0">
-            <a:schemeClr val="accent1"/>
-          </a:effectRef>
-          <a:fontRef idx="minor">
-            <a:schemeClr val="lt1"/>
-          </a:fontRef>
-        </p:style>
-        <p:txBody>
-          <a:bodyPr rtlCol="0" anchor="ctr"/>
-          <a:lstStyle/>
-          <a:p>
-            <a:pPr algn="ctr"/>
-            <a:endParaRPr lang="en-US"/>
-          </a:p>
-        </p:txBody>
-      </p:sp>
-      <p:sp>
-        <p:nvSpPr>
-          <p:cNvPr id="8" name="TextBox 7">
-            <a:extLst>
-              <a:ext uri="{FF2B5EF4-FFF2-40B4-BE49-F238E27FC236}">
-                <a16:creationId xmlns:a16="http://schemas.microsoft.com/office/drawing/2014/main" id="{7FCF7738-B381-4679-B6A9-921FD50370A9}"/>
+                <a16:creationId xmlns:a16="http://schemas.microsoft.com/office/drawing/2014/main" id="{D8199B82-B174-4EE0-ADA9-A1094052810F}"/>
               </a:ext>
             </a:extLst>
           </p:cNvPr>
@@ -7228,8 +6976,8 @@
         </p:nvSpPr>
         <p:spPr>
           <a:xfrm>
-            <a:off x="8610600" y="1905000"/>
-            <a:ext cx="2933700" cy="646331"/>
+            <a:off x="534152" y="1286509"/>
+            <a:ext cx="3799242" cy="338554"/>
           </a:xfrm>
           <a:prstGeom prst="rect">
             <a:avLst/>
@@ -7243,12 +6991,8 @@
           <a:lstStyle/>
           <a:p>
             <a:r>
-              <a:rPr lang="en-US" dirty="0">
-                <a:solidFill>
-                  <a:schemeClr val="accent2"/>
-                </a:solidFill>
-              </a:rPr>
-              <a:t>Geolocation graphs – input Zehra</a:t>
+              <a:rPr lang="en-US" sz="1600" b="1" dirty="0"/>
+              <a:t>Observations:</a:t>
             </a:r>
           </a:p>
         </p:txBody>
@@ -7256,7 +7000,7 @@
     </p:spTree>
     <p:extLst>
       <p:ext uri="{BB962C8B-B14F-4D97-AF65-F5344CB8AC3E}">
-        <p14:creationId xmlns:p14="http://schemas.microsoft.com/office/powerpoint/2010/main" val="1045495254"/>
+        <p14:creationId xmlns:p14="http://schemas.microsoft.com/office/powerpoint/2010/main" val="2530514182"/>
       </p:ext>
     </p:extLst>
   </p:cSld>
@@ -7285,6 +7029,55 @@
       </p:grpSpPr>
       <p:sp>
         <p:nvSpPr>
+          <p:cNvPr id="7" name="Rectangle 6">
+            <a:extLst>
+              <a:ext uri="{FF2B5EF4-FFF2-40B4-BE49-F238E27FC236}">
+                <a16:creationId xmlns:a16="http://schemas.microsoft.com/office/drawing/2014/main" id="{341266C4-D383-40D1-AAAD-36D04BD560F9}"/>
+              </a:ext>
+            </a:extLst>
+          </p:cNvPr>
+          <p:cNvSpPr/>
+          <p:nvPr/>
+        </p:nvSpPr>
+        <p:spPr>
+          <a:xfrm>
+            <a:off x="5082119" y="1156315"/>
+            <a:ext cx="6877050" cy="2637401"/>
+          </a:xfrm>
+          <a:prstGeom prst="rect">
+            <a:avLst/>
+          </a:prstGeom>
+          <a:solidFill>
+            <a:schemeClr val="tx1"/>
+          </a:solidFill>
+        </p:spPr>
+        <p:style>
+          <a:lnRef idx="2">
+            <a:schemeClr val="accent1">
+              <a:shade val="50000"/>
+            </a:schemeClr>
+          </a:lnRef>
+          <a:fillRef idx="1">
+            <a:schemeClr val="accent1"/>
+          </a:fillRef>
+          <a:effectRef idx="0">
+            <a:schemeClr val="accent1"/>
+          </a:effectRef>
+          <a:fontRef idx="minor">
+            <a:schemeClr val="lt1"/>
+          </a:fontRef>
+        </p:style>
+        <p:txBody>
+          <a:bodyPr rtlCol="0" anchor="ctr"/>
+          <a:lstStyle/>
+          <a:p>
+            <a:pPr algn="ctr"/>
+            <a:endParaRPr lang="en-US"/>
+          </a:p>
+        </p:txBody>
+      </p:sp>
+      <p:sp>
+        <p:nvSpPr>
           <p:cNvPr id="3" name="TextBox 2">
             <a:extLst>
               <a:ext uri="{FF2B5EF4-FFF2-40B4-BE49-F238E27FC236}">
@@ -7298,7 +7091,7 @@
         <p:spPr>
           <a:xfrm>
             <a:off x="534152" y="387412"/>
-            <a:ext cx="9588044" cy="646331"/>
+            <a:ext cx="10003750" cy="646331"/>
           </a:xfrm>
           <a:prstGeom prst="rect">
             <a:avLst/>
@@ -7322,17 +7115,124 @@
             </a:r>
             <a:r>
               <a:rPr lang="en-US" sz="1600" b="1" dirty="0"/>
-              <a:t>Covid-19 Rise in North Carolina vs. Twitter Geocoding</a:t>
-            </a:r>
-          </a:p>
-        </p:txBody>
-      </p:sp>
-      <p:sp>
-        <p:nvSpPr>
-          <p:cNvPr id="9" name="TextBox 8">
+              <a:t>North Carolina Twitter Activity vs. Covid-19 Progression</a:t>
+            </a:r>
+          </a:p>
+        </p:txBody>
+      </p:sp>
+      <p:pic>
+        <p:nvPicPr>
+          <p:cNvPr id="4" name="Picture 3">
             <a:extLst>
               <a:ext uri="{FF2B5EF4-FFF2-40B4-BE49-F238E27FC236}">
-                <a16:creationId xmlns:a16="http://schemas.microsoft.com/office/drawing/2014/main" id="{ED4AF83A-ACBF-4FE0-8922-5FF013FE6807}"/>
+                <a16:creationId xmlns:a16="http://schemas.microsoft.com/office/drawing/2014/main" id="{DFEDE17B-4292-4905-BE8A-3943E3EB9D47}"/>
+              </a:ext>
+            </a:extLst>
+          </p:cNvPr>
+          <p:cNvPicPr>
+            <a:picLocks noChangeAspect="1"/>
+          </p:cNvPicPr>
+          <p:nvPr/>
+        </p:nvPicPr>
+        <p:blipFill>
+          <a:blip r:embed="rId2"/>
+          <a:stretch>
+            <a:fillRect/>
+          </a:stretch>
+        </p:blipFill>
+        <p:spPr>
+          <a:xfrm>
+            <a:off x="5082119" y="4225158"/>
+            <a:ext cx="6877051" cy="2511283"/>
+          </a:xfrm>
+          <a:prstGeom prst="rect">
+            <a:avLst/>
+          </a:prstGeom>
+        </p:spPr>
+      </p:pic>
+      <p:pic>
+        <p:nvPicPr>
+          <p:cNvPr id="8" name="Picture 2">
+            <a:extLst>
+              <a:ext uri="{FF2B5EF4-FFF2-40B4-BE49-F238E27FC236}">
+                <a16:creationId xmlns:a16="http://schemas.microsoft.com/office/drawing/2014/main" id="{637A7537-81AB-4C06-8904-FD386D6514CD}"/>
+              </a:ext>
+            </a:extLst>
+          </p:cNvPr>
+          <p:cNvPicPr>
+            <a:picLocks noChangeAspect="1" noChangeArrowheads="1"/>
+          </p:cNvPicPr>
+          <p:nvPr/>
+        </p:nvPicPr>
+        <p:blipFill>
+          <a:blip r:embed="rId3">
+            <a:extLst>
+              <a:ext uri="{28A0092B-C50C-407E-A947-70E740481C1C}">
+                <a14:useLocalDpi xmlns:a14="http://schemas.microsoft.com/office/drawing/2010/main" val="0"/>
+              </a:ext>
+            </a:extLst>
+          </a:blip>
+          <a:stretch>
+            <a:fillRect/>
+          </a:stretch>
+        </p:blipFill>
+        <p:spPr bwMode="auto">
+          <a:xfrm>
+            <a:off x="5082119" y="1247944"/>
+            <a:ext cx="3336667" cy="2404402"/>
+          </a:xfrm>
+          <a:prstGeom prst="rect">
+            <a:avLst/>
+          </a:prstGeom>
+          <a:noFill/>
+          <a:effectLst/>
+          <a:extLst>
+            <a:ext uri="{909E8E84-426E-40DD-AFC4-6F175D3DCCD1}">
+              <a14:hiddenFill xmlns:a14="http://schemas.microsoft.com/office/drawing/2010/main">
+                <a:solidFill>
+                  <a:srgbClr val="FFFFFF"/>
+                </a:solidFill>
+              </a14:hiddenFill>
+            </a:ext>
+          </a:extLst>
+        </p:spPr>
+      </p:pic>
+      <p:pic>
+        <p:nvPicPr>
+          <p:cNvPr id="10" name="Picture 9">
+            <a:extLst>
+              <a:ext uri="{FF2B5EF4-FFF2-40B4-BE49-F238E27FC236}">
+                <a16:creationId xmlns:a16="http://schemas.microsoft.com/office/drawing/2014/main" id="{9D5636E3-1F38-4F96-8EE5-1C337A95C319}"/>
+              </a:ext>
+            </a:extLst>
+          </p:cNvPr>
+          <p:cNvPicPr>
+            <a:picLocks noChangeAspect="1"/>
+          </p:cNvPicPr>
+          <p:nvPr/>
+        </p:nvPicPr>
+        <p:blipFill>
+          <a:blip r:embed="rId4"/>
+          <a:stretch>
+            <a:fillRect/>
+          </a:stretch>
+        </p:blipFill>
+        <p:spPr>
+          <a:xfrm>
+            <a:off x="8418786" y="1247944"/>
+            <a:ext cx="3518341" cy="1957711"/>
+          </a:xfrm>
+          <a:prstGeom prst="rect">
+            <a:avLst/>
+          </a:prstGeom>
+        </p:spPr>
+      </p:pic>
+      <p:sp>
+        <p:nvSpPr>
+          <p:cNvPr id="12" name="TextBox 11">
+            <a:extLst>
+              <a:ext uri="{FF2B5EF4-FFF2-40B4-BE49-F238E27FC236}">
+                <a16:creationId xmlns:a16="http://schemas.microsoft.com/office/drawing/2014/main" id="{D0554501-3E9F-4E56-9FBD-E2AC1F7AC6F6}"/>
               </a:ext>
             </a:extLst>
           </p:cNvPr>
@@ -7341,8 +7241,8 @@
         </p:nvSpPr>
         <p:spPr>
           <a:xfrm>
-            <a:off x="470144" y="1150568"/>
-            <a:ext cx="10196623" cy="338554"/>
+            <a:off x="254873" y="1846381"/>
+            <a:ext cx="3327375" cy="338554"/>
           </a:xfrm>
           <a:prstGeom prst="rect">
             <a:avLst/>
@@ -7364,10 +7264,10 @@
       </p:sp>
       <p:sp>
         <p:nvSpPr>
-          <p:cNvPr id="5" name="TextBox 4">
+          <p:cNvPr id="13" name="TextBox 12">
             <a:extLst>
               <a:ext uri="{FF2B5EF4-FFF2-40B4-BE49-F238E27FC236}">
-                <a16:creationId xmlns:a16="http://schemas.microsoft.com/office/drawing/2014/main" id="{BCCA9899-05A3-4774-B7EF-C5CDC8A001A5}"/>
+                <a16:creationId xmlns:a16="http://schemas.microsoft.com/office/drawing/2014/main" id="{B2D2B093-93AA-407F-BE98-42DB23525526}"/>
               </a:ext>
             </a:extLst>
           </p:cNvPr>
@@ -7376,8 +7276,8 @@
         </p:nvSpPr>
         <p:spPr>
           <a:xfrm>
-            <a:off x="621792" y="1645920"/>
-            <a:ext cx="10625328" cy="1231106"/>
+            <a:off x="5082119" y="3842628"/>
+            <a:ext cx="3504833" cy="338554"/>
           </a:xfrm>
           <a:prstGeom prst="rect">
             <a:avLst/>
@@ -7390,43 +7290,67 @@
           </a:bodyPr>
           <a:lstStyle/>
           <a:p>
-            <a:pPr marL="342900" indent="-342900">
-              <a:buFontTx/>
-              <a:buAutoNum type="arabicParenR"/>
-            </a:pPr>
-            <a:r>
-              <a:rPr lang="en-US" sz="1400" dirty="0">
+            <a:r>
+              <a:rPr lang="en-US" sz="1600" b="1" dirty="0"/>
+              <a:t>Tweets by Location in May 2020:</a:t>
+            </a:r>
+          </a:p>
+        </p:txBody>
+      </p:sp>
+      <p:sp>
+        <p:nvSpPr>
+          <p:cNvPr id="14" name="TextBox 13">
+            <a:extLst>
+              <a:ext uri="{FF2B5EF4-FFF2-40B4-BE49-F238E27FC236}">
+                <a16:creationId xmlns:a16="http://schemas.microsoft.com/office/drawing/2014/main" id="{61CB062F-7B9C-434F-B422-6E46C368F33A}"/>
+              </a:ext>
+            </a:extLst>
+          </p:cNvPr>
+          <p:cNvSpPr txBox="1"/>
+          <p:nvPr/>
+        </p:nvSpPr>
+        <p:spPr>
+          <a:xfrm>
+            <a:off x="254873" y="2359684"/>
+            <a:ext cx="4393325" cy="3046988"/>
+          </a:xfrm>
+          <a:prstGeom prst="rect">
+            <a:avLst/>
+          </a:prstGeom>
+          <a:noFill/>
+        </p:spPr>
+        <p:txBody>
+          <a:bodyPr wrap="square" rtlCol="0">
+            <a:spAutoFit/>
+          </a:bodyPr>
+          <a:lstStyle/>
+          <a:p>
+            <a:r>
+              <a:rPr lang="en-US" sz="1600" dirty="0"/>
+              <a:t>A</a:t>
+            </a:r>
+            <a:r>
+              <a:rPr lang="en-US" sz="1600" dirty="0">
                 <a:effectLst/>
               </a:rPr>
-              <a:t>The data reflected that Mecklenburg County’s Covid-19 cases maintained a similar distribution to other North Carolina Metropolitan areas, however, they experienced a sharper increase in death rates.  </a:t>
-            </a:r>
-            <a:r>
-              <a:rPr lang="en-US" sz="1400" dirty="0">
-                <a:solidFill>
-                  <a:schemeClr val="accent2"/>
-                </a:solidFill>
-                <a:effectLst/>
-              </a:rPr>
-              <a:t>This corresponded to tweets…… Input from Zehra/Hector</a:t>
-            </a:r>
-          </a:p>
-          <a:p>
-            <a:pPr marL="342900" indent="-342900">
-              <a:buAutoNum type="arabicParenR"/>
-            </a:pPr>
-            <a:endParaRPr lang="en-US" sz="1400" dirty="0">
-              <a:effectLst/>
-            </a:endParaRPr>
-          </a:p>
-          <a:p>
-            <a:endParaRPr lang="en-US" dirty="0"/>
+              <a:t> The data reflected that Mecklenburg County’s Covid-19 cases maintained a similar distribution to other North Carolina Metropolitan areas, however, they experienced a sharper increase in death rates. </a:t>
+            </a:r>
+          </a:p>
+          <a:p>
+            <a:endParaRPr lang="en-US" sz="1600" dirty="0"/>
+          </a:p>
+          <a:p>
+            <a:r>
+              <a:rPr lang="en-US" sz="1600" dirty="0"/>
+              <a:t>The increase in death rates aligned with increased Twitter activity.  This behavior is aligned to the team’s hypothesis that Twitter activity increased as the pandemic progressed</a:t>
+            </a:r>
           </a:p>
         </p:txBody>
       </p:sp>
     </p:spTree>
     <p:extLst>
       <p:ext uri="{BB962C8B-B14F-4D97-AF65-F5344CB8AC3E}">
-        <p14:creationId xmlns:p14="http://schemas.microsoft.com/office/powerpoint/2010/main" val="3028989588"/>
+        <p14:creationId xmlns:p14="http://schemas.microsoft.com/office/powerpoint/2010/main" val="1174600213"/>
       </p:ext>
     </p:extLst>
   </p:cSld>
@@ -7488,21 +7412,18 @@
           <a:p>
             <a:r>
               <a:rPr lang="en-US" sz="3600" b="1" dirty="0"/>
-              <a:t>Discussion (cont.): </a:t>
-            </a:r>
-            <a:r>
-              <a:rPr lang="en-US" sz="1600" b="1" dirty="0"/>
-              <a:t>North Carolina Twitter Data vs. Covid-19 Progression</a:t>
-            </a:r>
-          </a:p>
-        </p:txBody>
-      </p:sp>
-      <p:sp>
-        <p:nvSpPr>
-          <p:cNvPr id="2" name="TextBox 1">
+              <a:t>Postmortem:</a:t>
+            </a:r>
+            <a:endParaRPr lang="en-US" sz="1600" b="1" dirty="0"/>
+          </a:p>
+        </p:txBody>
+      </p:sp>
+      <p:sp>
+        <p:nvSpPr>
+          <p:cNvPr id="9" name="TextBox 8">
             <a:extLst>
               <a:ext uri="{FF2B5EF4-FFF2-40B4-BE49-F238E27FC236}">
-                <a16:creationId xmlns:a16="http://schemas.microsoft.com/office/drawing/2014/main" id="{A5CDBD07-A912-48F3-821E-74B39B72A4ED}"/>
+                <a16:creationId xmlns:a16="http://schemas.microsoft.com/office/drawing/2014/main" id="{ED4AF83A-ACBF-4FE0-8922-5FF013FE6807}"/>
               </a:ext>
             </a:extLst>
           </p:cNvPr>
@@ -7511,8 +7432,8 @@
         </p:nvSpPr>
         <p:spPr>
           <a:xfrm>
-            <a:off x="1562100" y="2409825"/>
-            <a:ext cx="8305800" cy="369332"/>
+            <a:off x="470144" y="1150568"/>
+            <a:ext cx="10196623" cy="369332"/>
           </a:xfrm>
           <a:prstGeom prst="rect">
             <a:avLst/>
@@ -7526,12 +7447,184 @@
           <a:lstStyle/>
           <a:p>
             <a:r>
-              <a:rPr lang="en-US" dirty="0">
+              <a:rPr lang="en-US" b="1" dirty="0"/>
+              <a:t>Challenges:</a:t>
+            </a:r>
+          </a:p>
+        </p:txBody>
+      </p:sp>
+      <p:sp>
+        <p:nvSpPr>
+          <p:cNvPr id="2" name="TextBox 1">
+            <a:extLst>
+              <a:ext uri="{FF2B5EF4-FFF2-40B4-BE49-F238E27FC236}">
+                <a16:creationId xmlns:a16="http://schemas.microsoft.com/office/drawing/2014/main" id="{3587A4F7-6031-49CF-ADE0-3816B155DA0A}"/>
+              </a:ext>
+            </a:extLst>
+          </p:cNvPr>
+          <p:cNvSpPr txBox="1"/>
+          <p:nvPr/>
+        </p:nvSpPr>
+        <p:spPr>
+          <a:xfrm>
+            <a:off x="647700" y="1581150"/>
+            <a:ext cx="10801350" cy="1815882"/>
+          </a:xfrm>
+          <a:prstGeom prst="rect">
+            <a:avLst/>
+          </a:prstGeom>
+          <a:noFill/>
+        </p:spPr>
+        <p:txBody>
+          <a:bodyPr wrap="square" rtlCol="0">
+            <a:spAutoFit/>
+          </a:bodyPr>
+          <a:lstStyle/>
+          <a:p>
+            <a:r>
+              <a:rPr lang="en-US" sz="1400" b="1" dirty="0">
                 <a:solidFill>
-                  <a:schemeClr val="accent2"/>
+                  <a:srgbClr val="FF0000"/>
                 </a:solidFill>
               </a:rPr>
-              <a:t>Input from Jimmy</a:t>
+              <a:t>Scope: </a:t>
+            </a:r>
+            <a:r>
+              <a:rPr lang="en-US" sz="1400" dirty="0"/>
+              <a:t>Initially, the team wanted to pull in multiple social media providers to assess if Covid-19 increased usage of social media.  Additionally, the team wanted to use a year’s worth of pre-</a:t>
+            </a:r>
+            <a:r>
+              <a:rPr lang="en-US" sz="1400" dirty="0" err="1"/>
+              <a:t>Covid</a:t>
+            </a:r>
+            <a:r>
+              <a:rPr lang="en-US" sz="1400" dirty="0"/>
+              <a:t> social media use as a baseline and a year’s worth of Covid-19 social media use.  It quickly became apparent that this was too large a data set. </a:t>
+            </a:r>
+          </a:p>
+          <a:p>
+            <a:endParaRPr lang="en-US" sz="1400" dirty="0"/>
+          </a:p>
+          <a:p>
+            <a:r>
+              <a:rPr lang="en-US" sz="1400" b="1" dirty="0">
+                <a:solidFill>
+                  <a:srgbClr val="FF0000"/>
+                </a:solidFill>
+              </a:rPr>
+              <a:t>Data Retrieval:  </a:t>
+            </a:r>
+            <a:r>
+              <a:rPr lang="en-US" sz="1400" dirty="0"/>
+              <a:t>The team struggled to retrieve a sufficient data set from a social media provider.  Some of the data we wanted to leverage, such as geolocations, required paid for services.  This required the team to look for alternative data points.  Often these data points required significantly more cleaning. Additionally, the social media providers had several restrictions due to data privacy as to what could and could not be used. </a:t>
+            </a:r>
+          </a:p>
+        </p:txBody>
+      </p:sp>
+      <p:sp>
+        <p:nvSpPr>
+          <p:cNvPr id="6" name="TextBox 5">
+            <a:extLst>
+              <a:ext uri="{FF2B5EF4-FFF2-40B4-BE49-F238E27FC236}">
+                <a16:creationId xmlns:a16="http://schemas.microsoft.com/office/drawing/2014/main" id="{E22BD809-3B96-4B34-BE7B-D8E9EA0D9F32}"/>
+              </a:ext>
+            </a:extLst>
+          </p:cNvPr>
+          <p:cNvSpPr txBox="1"/>
+          <p:nvPr/>
+        </p:nvSpPr>
+        <p:spPr>
+          <a:xfrm>
+            <a:off x="534152" y="3931868"/>
+            <a:ext cx="10196623" cy="369332"/>
+          </a:xfrm>
+          <a:prstGeom prst="rect">
+            <a:avLst/>
+          </a:prstGeom>
+          <a:noFill/>
+        </p:spPr>
+        <p:txBody>
+          <a:bodyPr wrap="square" rtlCol="0">
+            <a:spAutoFit/>
+          </a:bodyPr>
+          <a:lstStyle/>
+          <a:p>
+            <a:r>
+              <a:rPr lang="en-US" b="1" dirty="0"/>
+              <a:t>Deeper Dive:</a:t>
+            </a:r>
+          </a:p>
+        </p:txBody>
+      </p:sp>
+      <p:sp>
+        <p:nvSpPr>
+          <p:cNvPr id="4" name="TextBox 3">
+            <a:extLst>
+              <a:ext uri="{FF2B5EF4-FFF2-40B4-BE49-F238E27FC236}">
+                <a16:creationId xmlns:a16="http://schemas.microsoft.com/office/drawing/2014/main" id="{7088FF67-14F9-4D8A-A20B-BE5D26B491EB}"/>
+              </a:ext>
+            </a:extLst>
+          </p:cNvPr>
+          <p:cNvSpPr txBox="1"/>
+          <p:nvPr/>
+        </p:nvSpPr>
+        <p:spPr>
+          <a:xfrm>
+            <a:off x="647700" y="4524375"/>
+            <a:ext cx="10801350" cy="1169551"/>
+          </a:xfrm>
+          <a:prstGeom prst="rect">
+            <a:avLst/>
+          </a:prstGeom>
+          <a:noFill/>
+        </p:spPr>
+        <p:txBody>
+          <a:bodyPr wrap="square" rtlCol="0">
+            <a:spAutoFit/>
+          </a:bodyPr>
+          <a:lstStyle/>
+          <a:p>
+            <a:pPr marL="342900" indent="-342900">
+              <a:buAutoNum type="arabicPeriod"/>
+            </a:pPr>
+            <a:r>
+              <a:rPr lang="en-US" sz="1400" dirty="0"/>
+              <a:t>If we compared Twitter to another social media provider, would our findings be consistent?</a:t>
+            </a:r>
+          </a:p>
+          <a:p>
+            <a:pPr marL="342900" indent="-342900">
+              <a:buAutoNum type="arabicPeriod"/>
+            </a:pPr>
+            <a:endParaRPr lang="en-US" sz="1400" dirty="0"/>
+          </a:p>
+          <a:p>
+            <a:pPr marL="342900" indent="-342900">
+              <a:buAutoNum type="arabicPeriod"/>
+            </a:pPr>
+            <a:r>
+              <a:rPr lang="en-US" sz="1400" dirty="0"/>
+              <a:t>Would we see similar trends in the Twitter data if we included rural counties. </a:t>
+            </a:r>
+          </a:p>
+          <a:p>
+            <a:pPr marL="342900" indent="-342900">
+              <a:buAutoNum type="arabicPeriod" startAt="2"/>
+            </a:pPr>
+            <a:endParaRPr lang="en-US" sz="1400" dirty="0"/>
+          </a:p>
+          <a:p>
+            <a:r>
+              <a:rPr lang="en-US" sz="1400" dirty="0"/>
+              <a:t>3.	Is </a:t>
+            </a:r>
+            <a:r>
+              <a:rPr lang="en-US" sz="1400" dirty="0" err="1"/>
+              <a:t>Covid</a:t>
+            </a:r>
+            <a:r>
+              <a:rPr lang="en-US" sz="1400" dirty="0"/>
+              <a:t> fatigue now having an impact on tweeting activity?</a:t>
             </a:r>
           </a:p>
         </p:txBody>
@@ -7539,7 +7632,7 @@
     </p:spTree>
     <p:extLst>
       <p:ext uri="{BB962C8B-B14F-4D97-AF65-F5344CB8AC3E}">
-        <p14:creationId xmlns:p14="http://schemas.microsoft.com/office/powerpoint/2010/main" val="2530514182"/>
+        <p14:creationId xmlns:p14="http://schemas.microsoft.com/office/powerpoint/2010/main" val="3092305912"/>
       </p:ext>
     </p:extLst>
   </p:cSld>
@@ -7580,7 +7673,7 @@
         </p:nvSpPr>
         <p:spPr>
           <a:xfrm>
-            <a:off x="534152" y="387412"/>
+            <a:off x="1115177" y="2782669"/>
             <a:ext cx="9588044" cy="646331"/>
           </a:xfrm>
           <a:prstGeom prst="rect">
@@ -7599,107 +7692,19 @@
           </a:bodyPr>
           <a:lstStyle/>
           <a:p>
+            <a:pPr algn="ctr"/>
             <a:r>
               <a:rPr lang="en-US" sz="3600" b="1" dirty="0"/>
-              <a:t>Discussion (cont.): </a:t>
-            </a:r>
-            <a:r>
-              <a:rPr lang="en-US" sz="1600" b="1" dirty="0"/>
-              <a:t>North Carolina Twitter Data vs. Covid-19 Progression</a:t>
-            </a:r>
-          </a:p>
-        </p:txBody>
-      </p:sp>
-      <p:sp>
-        <p:nvSpPr>
-          <p:cNvPr id="9" name="TextBox 8">
-            <a:extLst>
-              <a:ext uri="{FF2B5EF4-FFF2-40B4-BE49-F238E27FC236}">
-                <a16:creationId xmlns:a16="http://schemas.microsoft.com/office/drawing/2014/main" id="{ED4AF83A-ACBF-4FE0-8922-5FF013FE6807}"/>
-              </a:ext>
-            </a:extLst>
-          </p:cNvPr>
-          <p:cNvSpPr txBox="1"/>
-          <p:nvPr/>
-        </p:nvSpPr>
-        <p:spPr>
-          <a:xfrm>
-            <a:off x="470144" y="1150568"/>
-            <a:ext cx="10196623" cy="338554"/>
-          </a:xfrm>
-          <a:prstGeom prst="rect">
-            <a:avLst/>
-          </a:prstGeom>
-          <a:noFill/>
-        </p:spPr>
-        <p:txBody>
-          <a:bodyPr wrap="square" rtlCol="0">
-            <a:spAutoFit/>
-          </a:bodyPr>
-          <a:lstStyle/>
-          <a:p>
-            <a:r>
-              <a:rPr lang="en-US" sz="1600" b="1" dirty="0"/>
-              <a:t>Observations:</a:t>
-            </a:r>
-          </a:p>
-        </p:txBody>
-      </p:sp>
-      <p:sp>
-        <p:nvSpPr>
-          <p:cNvPr id="5" name="TextBox 4">
-            <a:extLst>
-              <a:ext uri="{FF2B5EF4-FFF2-40B4-BE49-F238E27FC236}">
-                <a16:creationId xmlns:a16="http://schemas.microsoft.com/office/drawing/2014/main" id="{BCCA9899-05A3-4774-B7EF-C5CDC8A001A5}"/>
-              </a:ext>
-            </a:extLst>
-          </p:cNvPr>
-          <p:cNvSpPr txBox="1"/>
-          <p:nvPr/>
-        </p:nvSpPr>
-        <p:spPr>
-          <a:xfrm>
-            <a:off x="621792" y="1645920"/>
-            <a:ext cx="10625328" cy="584775"/>
-          </a:xfrm>
-          <a:prstGeom prst="rect">
-            <a:avLst/>
-          </a:prstGeom>
-          <a:noFill/>
-        </p:spPr>
-        <p:txBody>
-          <a:bodyPr wrap="square" rtlCol="0">
-            <a:spAutoFit/>
-          </a:bodyPr>
-          <a:lstStyle/>
-          <a:p>
-            <a:pPr marL="342900" indent="-342900">
-              <a:buAutoNum type="arabicParenR"/>
-            </a:pPr>
-            <a:r>
-              <a:rPr lang="en-US" sz="1400" dirty="0">
-                <a:solidFill>
-                  <a:schemeClr val="accent2"/>
-                </a:solidFill>
-              </a:rPr>
-              <a:t>Input from Jimmy</a:t>
-            </a:r>
-            <a:endParaRPr lang="en-US" sz="1400" dirty="0">
-              <a:solidFill>
-                <a:schemeClr val="accent2"/>
-              </a:solidFill>
-              <a:effectLst/>
-            </a:endParaRPr>
-          </a:p>
-          <a:p>
-            <a:endParaRPr lang="en-US" dirty="0"/>
+              <a:t>QUESTIONS?</a:t>
+            </a:r>
+            <a:endParaRPr lang="en-US" sz="1600" b="1" dirty="0"/>
           </a:p>
         </p:txBody>
       </p:sp>
     </p:spTree>
     <p:extLst>
       <p:ext uri="{BB962C8B-B14F-4D97-AF65-F5344CB8AC3E}">
-        <p14:creationId xmlns:p14="http://schemas.microsoft.com/office/powerpoint/2010/main" val="1174600213"/>
+        <p14:creationId xmlns:p14="http://schemas.microsoft.com/office/powerpoint/2010/main" val="2614430604"/>
       </p:ext>
     </p:extLst>
   </p:cSld>
@@ -7728,357 +7733,6 @@
       </p:grpSpPr>
       <p:sp>
         <p:nvSpPr>
-          <p:cNvPr id="3" name="TextBox 2">
-            <a:extLst>
-              <a:ext uri="{FF2B5EF4-FFF2-40B4-BE49-F238E27FC236}">
-                <a16:creationId xmlns:a16="http://schemas.microsoft.com/office/drawing/2014/main" id="{5379D1CF-9171-4F6F-AA24-C44140479540}"/>
-              </a:ext>
-            </a:extLst>
-          </p:cNvPr>
-          <p:cNvSpPr txBox="1"/>
-          <p:nvPr/>
-        </p:nvSpPr>
-        <p:spPr>
-          <a:xfrm>
-            <a:off x="534152" y="387412"/>
-            <a:ext cx="9588044" cy="646331"/>
-          </a:xfrm>
-          <a:prstGeom prst="rect">
-            <a:avLst/>
-          </a:prstGeom>
-          <a:noFill/>
-          <a:ln>
-            <a:solidFill>
-              <a:schemeClr val="accent1"/>
-            </a:solidFill>
-          </a:ln>
-        </p:spPr>
-        <p:txBody>
-          <a:bodyPr wrap="square" rtlCol="0">
-            <a:spAutoFit/>
-          </a:bodyPr>
-          <a:lstStyle/>
-          <a:p>
-            <a:r>
-              <a:rPr lang="en-US" sz="3600" b="1" dirty="0"/>
-              <a:t>Postmortem:</a:t>
-            </a:r>
-            <a:endParaRPr lang="en-US" sz="1600" b="1" dirty="0"/>
-          </a:p>
-        </p:txBody>
-      </p:sp>
-      <p:sp>
-        <p:nvSpPr>
-          <p:cNvPr id="9" name="TextBox 8">
-            <a:extLst>
-              <a:ext uri="{FF2B5EF4-FFF2-40B4-BE49-F238E27FC236}">
-                <a16:creationId xmlns:a16="http://schemas.microsoft.com/office/drawing/2014/main" id="{ED4AF83A-ACBF-4FE0-8922-5FF013FE6807}"/>
-              </a:ext>
-            </a:extLst>
-          </p:cNvPr>
-          <p:cNvSpPr txBox="1"/>
-          <p:nvPr/>
-        </p:nvSpPr>
-        <p:spPr>
-          <a:xfrm>
-            <a:off x="470144" y="1150568"/>
-            <a:ext cx="10196623" cy="369332"/>
-          </a:xfrm>
-          <a:prstGeom prst="rect">
-            <a:avLst/>
-          </a:prstGeom>
-          <a:noFill/>
-        </p:spPr>
-        <p:txBody>
-          <a:bodyPr wrap="square" rtlCol="0">
-            <a:spAutoFit/>
-          </a:bodyPr>
-          <a:lstStyle/>
-          <a:p>
-            <a:r>
-              <a:rPr lang="en-US" b="1" dirty="0"/>
-              <a:t>Challenges:</a:t>
-            </a:r>
-          </a:p>
-        </p:txBody>
-      </p:sp>
-      <p:sp>
-        <p:nvSpPr>
-          <p:cNvPr id="2" name="TextBox 1">
-            <a:extLst>
-              <a:ext uri="{FF2B5EF4-FFF2-40B4-BE49-F238E27FC236}">
-                <a16:creationId xmlns:a16="http://schemas.microsoft.com/office/drawing/2014/main" id="{3587A4F7-6031-49CF-ADE0-3816B155DA0A}"/>
-              </a:ext>
-            </a:extLst>
-          </p:cNvPr>
-          <p:cNvSpPr txBox="1"/>
-          <p:nvPr/>
-        </p:nvSpPr>
-        <p:spPr>
-          <a:xfrm>
-            <a:off x="647700" y="1581150"/>
-            <a:ext cx="10801350" cy="1815882"/>
-          </a:xfrm>
-          <a:prstGeom prst="rect">
-            <a:avLst/>
-          </a:prstGeom>
-          <a:noFill/>
-        </p:spPr>
-        <p:txBody>
-          <a:bodyPr wrap="square" rtlCol="0">
-            <a:spAutoFit/>
-          </a:bodyPr>
-          <a:lstStyle/>
-          <a:p>
-            <a:r>
-              <a:rPr lang="en-US" sz="1400" b="1" dirty="0">
-                <a:solidFill>
-                  <a:srgbClr val="FF0000"/>
-                </a:solidFill>
-              </a:rPr>
-              <a:t>Scope: </a:t>
-            </a:r>
-            <a:r>
-              <a:rPr lang="en-US" sz="1400" dirty="0"/>
-              <a:t>Initially, the team wanted to pull in multiple social media providers to assess if Covid-19 increased usage of social media.  Additionally, the team wanted to use a year’s worth of pre-</a:t>
-            </a:r>
-            <a:r>
-              <a:rPr lang="en-US" sz="1400" dirty="0" err="1"/>
-              <a:t>Covid</a:t>
-            </a:r>
-            <a:r>
-              <a:rPr lang="en-US" sz="1400" dirty="0"/>
-              <a:t> social media use as a baseline and a year’s worth of Covid-19 social media use.  It quickly became apparent that this was too large a data set. </a:t>
-            </a:r>
-          </a:p>
-          <a:p>
-            <a:endParaRPr lang="en-US" sz="1400" dirty="0"/>
-          </a:p>
-          <a:p>
-            <a:r>
-              <a:rPr lang="en-US" sz="1400" b="1" dirty="0">
-                <a:solidFill>
-                  <a:srgbClr val="FF0000"/>
-                </a:solidFill>
-              </a:rPr>
-              <a:t>Data Retrieval:  </a:t>
-            </a:r>
-            <a:r>
-              <a:rPr lang="en-US" sz="1400" dirty="0"/>
-              <a:t>The team struggled to retrieve a sufficient data set from a social media provider.  Some of the data we wanted to leverage, such as geolocations, required paid for services.  This required the team to look for alternative data points.  Often these data points required significantly more cleaning. Additionally, the social media providers had several restrictions due to data privacy as to what could and could not be used. </a:t>
-            </a:r>
-          </a:p>
-        </p:txBody>
-      </p:sp>
-      <p:sp>
-        <p:nvSpPr>
-          <p:cNvPr id="6" name="TextBox 5">
-            <a:extLst>
-              <a:ext uri="{FF2B5EF4-FFF2-40B4-BE49-F238E27FC236}">
-                <a16:creationId xmlns:a16="http://schemas.microsoft.com/office/drawing/2014/main" id="{E22BD809-3B96-4B34-BE7B-D8E9EA0D9F32}"/>
-              </a:ext>
-            </a:extLst>
-          </p:cNvPr>
-          <p:cNvSpPr txBox="1"/>
-          <p:nvPr/>
-        </p:nvSpPr>
-        <p:spPr>
-          <a:xfrm>
-            <a:off x="534152" y="3931868"/>
-            <a:ext cx="10196623" cy="369332"/>
-          </a:xfrm>
-          <a:prstGeom prst="rect">
-            <a:avLst/>
-          </a:prstGeom>
-          <a:noFill/>
-        </p:spPr>
-        <p:txBody>
-          <a:bodyPr wrap="square" rtlCol="0">
-            <a:spAutoFit/>
-          </a:bodyPr>
-          <a:lstStyle/>
-          <a:p>
-            <a:r>
-              <a:rPr lang="en-US" b="1" dirty="0"/>
-              <a:t>Deeper Dive:</a:t>
-            </a:r>
-          </a:p>
-        </p:txBody>
-      </p:sp>
-      <p:sp>
-        <p:nvSpPr>
-          <p:cNvPr id="4" name="TextBox 3">
-            <a:extLst>
-              <a:ext uri="{FF2B5EF4-FFF2-40B4-BE49-F238E27FC236}">
-                <a16:creationId xmlns:a16="http://schemas.microsoft.com/office/drawing/2014/main" id="{7088FF67-14F9-4D8A-A20B-BE5D26B491EB}"/>
-              </a:ext>
-            </a:extLst>
-          </p:cNvPr>
-          <p:cNvSpPr txBox="1"/>
-          <p:nvPr/>
-        </p:nvSpPr>
-        <p:spPr>
-          <a:xfrm>
-            <a:off x="647700" y="4524375"/>
-            <a:ext cx="10801350" cy="1384995"/>
-          </a:xfrm>
-          <a:prstGeom prst="rect">
-            <a:avLst/>
-          </a:prstGeom>
-          <a:noFill/>
-        </p:spPr>
-        <p:txBody>
-          <a:bodyPr wrap="square" rtlCol="0">
-            <a:spAutoFit/>
-          </a:bodyPr>
-          <a:lstStyle/>
-          <a:p>
-            <a:r>
-              <a:rPr lang="en-US" sz="1400" dirty="0"/>
-              <a:t>1.	If we compared Twitter to another social media provider, would our findings be consistent?</a:t>
-            </a:r>
-          </a:p>
-          <a:p>
-            <a:endParaRPr lang="en-US" sz="1400" dirty="0"/>
-          </a:p>
-          <a:p>
-            <a:pPr marL="342900" indent="-342900">
-              <a:buAutoNum type="arabicPeriod" startAt="2"/>
-            </a:pPr>
-            <a:r>
-              <a:rPr lang="en-US" sz="1400" dirty="0"/>
-              <a:t>Is there a difference in the political slant of a headline and where in US we would see a greater uptick in tweeting 	activity?</a:t>
-            </a:r>
-          </a:p>
-          <a:p>
-            <a:pPr marL="342900" indent="-342900">
-              <a:buAutoNum type="arabicPeriod" startAt="2"/>
-            </a:pPr>
-            <a:endParaRPr lang="en-US" sz="1400" dirty="0"/>
-          </a:p>
-          <a:p>
-            <a:pPr marL="342900" indent="-342900">
-              <a:buAutoNum type="arabicPeriod" startAt="2"/>
-            </a:pPr>
-            <a:r>
-              <a:rPr lang="en-US" sz="1400" dirty="0"/>
-              <a:t>Is </a:t>
-            </a:r>
-            <a:r>
-              <a:rPr lang="en-US" sz="1400" dirty="0" err="1"/>
-              <a:t>Covid</a:t>
-            </a:r>
-            <a:r>
-              <a:rPr lang="en-US" sz="1400" dirty="0"/>
-              <a:t> fatigue now having an impact on tweeting activity?</a:t>
-            </a:r>
-          </a:p>
-        </p:txBody>
-      </p:sp>
-    </p:spTree>
-    <p:extLst>
-      <p:ext uri="{BB962C8B-B14F-4D97-AF65-F5344CB8AC3E}">
-        <p14:creationId xmlns:p14="http://schemas.microsoft.com/office/powerpoint/2010/main" val="3092305912"/>
-      </p:ext>
-    </p:extLst>
-  </p:cSld>
-  <p:clrMapOvr>
-    <a:masterClrMapping/>
-  </p:clrMapOvr>
-</p:sld>
-</file>
-
-<file path=ppt/slides/slide16.xml><?xml version="1.0" encoding="utf-8"?>
-<p:sld xmlns:a="http://schemas.openxmlformats.org/drawingml/2006/main" xmlns:r="http://schemas.openxmlformats.org/officeDocument/2006/relationships" xmlns:p="http://schemas.openxmlformats.org/presentationml/2006/main">
-  <p:cSld>
-    <p:spTree>
-      <p:nvGrpSpPr>
-        <p:cNvPr id="1" name=""/>
-        <p:cNvGrpSpPr/>
-        <p:nvPr/>
-      </p:nvGrpSpPr>
-      <p:grpSpPr>
-        <a:xfrm>
-          <a:off x="0" y="0"/>
-          <a:ext cx="0" cy="0"/>
-          <a:chOff x="0" y="0"/>
-          <a:chExt cx="0" cy="0"/>
-        </a:xfrm>
-      </p:grpSpPr>
-      <p:sp>
-        <p:nvSpPr>
-          <p:cNvPr id="3" name="TextBox 2">
-            <a:extLst>
-              <a:ext uri="{FF2B5EF4-FFF2-40B4-BE49-F238E27FC236}">
-                <a16:creationId xmlns:a16="http://schemas.microsoft.com/office/drawing/2014/main" id="{5379D1CF-9171-4F6F-AA24-C44140479540}"/>
-              </a:ext>
-            </a:extLst>
-          </p:cNvPr>
-          <p:cNvSpPr txBox="1"/>
-          <p:nvPr/>
-        </p:nvSpPr>
-        <p:spPr>
-          <a:xfrm>
-            <a:off x="1115177" y="2782669"/>
-            <a:ext cx="9588044" cy="646331"/>
-          </a:xfrm>
-          <a:prstGeom prst="rect">
-            <a:avLst/>
-          </a:prstGeom>
-          <a:noFill/>
-          <a:ln>
-            <a:solidFill>
-              <a:schemeClr val="accent1"/>
-            </a:solidFill>
-          </a:ln>
-        </p:spPr>
-        <p:txBody>
-          <a:bodyPr wrap="square" rtlCol="0">
-            <a:spAutoFit/>
-          </a:bodyPr>
-          <a:lstStyle/>
-          <a:p>
-            <a:pPr algn="ctr"/>
-            <a:r>
-              <a:rPr lang="en-US" sz="3600" b="1" dirty="0"/>
-              <a:t>QUESTIONS?</a:t>
-            </a:r>
-            <a:endParaRPr lang="en-US" sz="1600" b="1" dirty="0"/>
-          </a:p>
-        </p:txBody>
-      </p:sp>
-    </p:spTree>
-    <p:extLst>
-      <p:ext uri="{BB962C8B-B14F-4D97-AF65-F5344CB8AC3E}">
-        <p14:creationId xmlns:p14="http://schemas.microsoft.com/office/powerpoint/2010/main" val="2614430604"/>
-      </p:ext>
-    </p:extLst>
-  </p:cSld>
-  <p:clrMapOvr>
-    <a:masterClrMapping/>
-  </p:clrMapOvr>
-</p:sld>
-</file>
-
-<file path=ppt/slides/slide17.xml><?xml version="1.0" encoding="utf-8"?>
-<p:sld xmlns:a="http://schemas.openxmlformats.org/drawingml/2006/main" xmlns:r="http://schemas.openxmlformats.org/officeDocument/2006/relationships" xmlns:p="http://schemas.openxmlformats.org/presentationml/2006/main">
-  <p:cSld>
-    <p:spTree>
-      <p:nvGrpSpPr>
-        <p:cNvPr id="1" name=""/>
-        <p:cNvGrpSpPr/>
-        <p:nvPr/>
-      </p:nvGrpSpPr>
-      <p:grpSpPr>
-        <a:xfrm>
-          <a:off x="0" y="0"/>
-          <a:ext cx="0" cy="0"/>
-          <a:chOff x="0" y="0"/>
-          <a:chExt cx="0" cy="0"/>
-        </a:xfrm>
-      </p:grpSpPr>
-      <p:sp>
-        <p:nvSpPr>
           <p:cNvPr id="2" name="Title 1">
             <a:extLst>
               <a:ext uri="{FF2B5EF4-FFF2-40B4-BE49-F238E27FC236}">
@@ -8123,7 +7777,7 @@
 </p:sld>
 </file>
 
-<file path=ppt/slides/slide18.xml><?xml version="1.0" encoding="utf-8"?>
+<file path=ppt/slides/slide16.xml><?xml version="1.0" encoding="utf-8"?>
 <p:sld xmlns:a="http://schemas.openxmlformats.org/drawingml/2006/main" xmlns:r="http://schemas.openxmlformats.org/officeDocument/2006/relationships" xmlns:p="http://schemas.openxmlformats.org/presentationml/2006/main">
   <p:cSld>
     <p:spTree>
@@ -8320,7 +7974,7 @@
 </p:sld>
 </file>
 
-<file path=ppt/slides/slide19.xml><?xml version="1.0" encoding="utf-8"?>
+<file path=ppt/slides/slide17.xml><?xml version="1.0" encoding="utf-8"?>
 <p:sld xmlns:a="http://schemas.openxmlformats.org/drawingml/2006/main" xmlns:r="http://schemas.openxmlformats.org/officeDocument/2006/relationships" xmlns:p="http://schemas.openxmlformats.org/presentationml/2006/main">
   <p:cSld>
     <p:spTree>
@@ -8561,7 +8215,7 @@
         <p:spPr>
           <a:xfrm>
             <a:off x="534152" y="1033743"/>
-            <a:ext cx="10991542" cy="1135299"/>
+            <a:ext cx="10991542" cy="761603"/>
           </a:xfrm>
         </p:spPr>
         <p:txBody>
@@ -8636,8 +8290,8 @@
         </p:nvSpPr>
         <p:spPr>
           <a:xfrm>
-            <a:off x="534152" y="2026346"/>
-            <a:ext cx="10196623" cy="338554"/>
+            <a:off x="534152" y="1964623"/>
+            <a:ext cx="10196623" cy="307777"/>
           </a:xfrm>
           <a:prstGeom prst="rect">
             <a:avLst/>
@@ -8651,7 +8305,7 @@
           <a:lstStyle/>
           <a:p>
             <a:r>
-              <a:rPr lang="en-US" sz="1600" b="1" dirty="0"/>
+              <a:rPr lang="en-US" sz="1400" b="1" dirty="0"/>
               <a:t>Questions &amp; Analysis:</a:t>
             </a:r>
           </a:p>
@@ -8671,7 +8325,7 @@
         </p:nvSpPr>
         <p:spPr>
           <a:xfrm>
-            <a:off x="534152" y="2364900"/>
+            <a:off x="534152" y="2441677"/>
             <a:ext cx="11342415" cy="4211666"/>
           </a:xfrm>
           <a:prstGeom prst="rect">
@@ -8697,7 +8351,7 @@
               <a:buAutoNum type="arabicPeriod"/>
             </a:pPr>
             <a:r>
-              <a:rPr lang="en-US" sz="1200" b="1" dirty="0"/>
+              <a:rPr lang="en-US" sz="1200" b="1" i="1" dirty="0"/>
               <a:t>Are Covid-19 references on Twitter linked to virus progression both globally and in North Carolina?</a:t>
             </a:r>
           </a:p>
@@ -8712,8 +8366,8 @@
               <a:buClrTx/>
             </a:pPr>
             <a:r>
-              <a:rPr lang="en-US" sz="1200" dirty="0"/>
-              <a:t>	Early pandemic global references to Covid-19 on Twitter fluctuated and increases were linked to major headline days. </a:t>
+              <a:rPr lang="en-US" sz="1200" i="1" dirty="0"/>
+              <a:t>	Early pandemic global Twitter Covid-19 references fluctuated and were linked to major headline days.  As the Covid-19 progressed in NC, the 	team did see Twitter activity increase in the counties sampled. </a:t>
             </a:r>
           </a:p>
           <a:p>
@@ -8727,32 +8381,8 @@
               <a:buClrTx/>
             </a:pPr>
             <a:r>
-              <a:rPr lang="en-US" sz="1200" dirty="0"/>
-              <a:t>	</a:t>
-            </a:r>
-            <a:r>
-              <a:rPr lang="en-US" sz="1200" dirty="0">
-                <a:solidFill>
-                  <a:schemeClr val="accent2"/>
-                </a:solidFill>
-              </a:rPr>
-              <a:t>TBD – Twitter Data Mar – May Jimmy to populate</a:t>
-            </a:r>
-          </a:p>
-          <a:p>
-            <a:pPr marL="342900" indent="-342900">
-              <a:lnSpc>
-                <a:spcPct val="150000"/>
-              </a:lnSpc>
-              <a:spcBef>
-                <a:spcPts val="0"/>
-              </a:spcBef>
-              <a:buClrTx/>
-              <a:buAutoNum type="arabicPeriod" startAt="2"/>
-            </a:pPr>
-            <a:r>
-              <a:rPr lang="en-US" sz="1200" b="1" dirty="0"/>
-              <a:t>Does location impact the probability of Twitter use as the virus progressed?</a:t>
+              <a:rPr lang="en-US" sz="1200" b="1" i="1" dirty="0"/>
+              <a:t>2.	Does location impact the probability of Twitter use as the virus progressed?</a:t>
             </a:r>
           </a:p>
           <a:p>
@@ -8762,12 +8392,8 @@
               </a:lnSpc>
             </a:pPr>
             <a:r>
-              <a:rPr lang="en-US" sz="1200" dirty="0">
-                <a:solidFill>
-                  <a:schemeClr val="accent2"/>
-                </a:solidFill>
-              </a:rPr>
-              <a:t>TBD – Zehra to populate</a:t>
+              <a:rPr lang="en-US" sz="1200" i="1" dirty="0"/>
+              <a:t>Yes, areas experiencing higher impact from Covid-19 Tweeted, Liked, Retweeted more frequently.  </a:t>
             </a:r>
           </a:p>
           <a:p>
@@ -8782,7 +8408,7 @@
               <a:buAutoNum type="arabicPeriod" startAt="3"/>
             </a:pPr>
             <a:r>
-              <a:rPr lang="en-US" sz="1200" b="1" dirty="0"/>
+              <a:rPr lang="en-US" sz="1200" b="1" i="1" dirty="0"/>
               <a:t>As the number of cases and deaths increased, did Twitter original Tweets increase?</a:t>
             </a:r>
           </a:p>
@@ -8797,33 +8423,22 @@
               <a:buClrTx/>
             </a:pPr>
             <a:r>
-              <a:rPr lang="en-US" sz="1200" b="1" dirty="0"/>
+              <a:rPr lang="en-US" sz="1200" b="1" i="1" dirty="0"/>
               <a:t>	</a:t>
             </a:r>
             <a:r>
-              <a:rPr lang="en-US" sz="1200" dirty="0"/>
-              <a:t>Early pandemic increases in original tweets were linked to headlines, but there was a slow increase regular original Tweets as the virus 	progressed into late February. </a:t>
-            </a:r>
-          </a:p>
-          <a:p>
-            <a:pPr>
-              <a:lnSpc>
-                <a:spcPct val="150000"/>
-              </a:lnSpc>
-            </a:pPr>
-            <a:r>
-              <a:rPr lang="en-US" sz="1200" dirty="0"/>
-              <a:t>	</a:t>
-            </a:r>
-            <a:r>
-              <a:rPr lang="en-US" sz="1200" dirty="0">
+              <a:rPr lang="en-US" sz="1200" i="1" dirty="0"/>
+              <a:t>Early pandemic increases in original tweets were linked to headlines, but there was a slow increase regular original Tweets as the virus progressed 	into late February.   </a:t>
+            </a:r>
+            <a:r>
+              <a:rPr lang="en-US" sz="1200" i="1" dirty="0">
                 <a:solidFill>
                   <a:schemeClr val="accent2"/>
                 </a:solidFill>
               </a:rPr>
-              <a:t>TBD – North Carolina Data set – Jimmy</a:t>
-            </a:r>
-            <a:endParaRPr lang="en-US" sz="1200" dirty="0"/>
+              <a:t>TBD – North Carolina Data set </a:t>
+            </a:r>
+            <a:endParaRPr lang="en-US" sz="1200" i="1" dirty="0"/>
           </a:p>
           <a:p>
             <a:pPr marL="342900" indent="-342900">
@@ -8837,7 +8452,7 @@
               <a:buAutoNum type="arabicPeriod" startAt="4"/>
             </a:pPr>
             <a:r>
-              <a:rPr lang="en-US" sz="1200" b="1" dirty="0"/>
+              <a:rPr lang="en-US" sz="1200" b="1" i="1" dirty="0"/>
               <a:t>As the number of cases and deaths increased, did Twitter retweets and likes increase?  </a:t>
             </a:r>
           </a:p>
@@ -8852,33 +8467,13 @@
               <a:buClrTx/>
             </a:pPr>
             <a:r>
-              <a:rPr lang="en-US" sz="1200" b="1" dirty="0"/>
+              <a:rPr lang="en-US" sz="1200" b="1" i="1" dirty="0"/>
               <a:t>	</a:t>
             </a:r>
             <a:r>
-              <a:rPr lang="en-US" sz="1200" dirty="0"/>
-              <a:t>Yes, as the virus progressed original Tweets did receive a growing number of retweets and likes. </a:t>
-            </a:r>
-          </a:p>
-          <a:p>
-            <a:pPr>
-              <a:lnSpc>
-                <a:spcPct val="150000"/>
-              </a:lnSpc>
-            </a:pPr>
-            <a:r>
-              <a:rPr lang="en-US" sz="1200" dirty="0"/>
-              <a:t>	</a:t>
-            </a:r>
-            <a:r>
-              <a:rPr lang="en-US" sz="1200" dirty="0">
-                <a:solidFill>
-                  <a:schemeClr val="accent2"/>
-                </a:solidFill>
-              </a:rPr>
-              <a:t>TBD – North Carolina Data set – Jimmy</a:t>
-            </a:r>
-            <a:endParaRPr lang="en-US" sz="1200" b="1" dirty="0"/>
+              <a:rPr lang="en-US" sz="1200" i="1" dirty="0"/>
+              <a:t>Yes, as the virus progressed original Tweets did receive a growing number of retweets and likes from the global analysis.  The same trend was 	identified in NC Metropolitan areas.  </a:t>
+            </a:r>
           </a:p>
           <a:p>
             <a:pPr marL="228600" indent="-228600">
@@ -8892,7 +8487,7 @@
               <a:buAutoNum type="arabicPeriod" startAt="5"/>
             </a:pPr>
             <a:r>
-              <a:rPr lang="en-US" sz="1200" b="1" dirty="0"/>
+              <a:rPr lang="en-US" sz="1200" b="1" i="1" dirty="0"/>
               <a:t>Is North Carolina a good representation of US COVID-19 trends and what thereby can be inferred about Twitter usage?</a:t>
             </a:r>
           </a:p>
@@ -8903,18 +8498,9 @@
               </a:lnSpc>
             </a:pPr>
             <a:r>
-              <a:rPr lang="en-US" sz="1200" b="1" dirty="0"/>
-              <a:t>	</a:t>
-            </a:r>
-            <a:r>
-              <a:rPr lang="en-US" sz="1200" dirty="0">
-                <a:solidFill>
-                  <a:schemeClr val="accent2"/>
-                </a:solidFill>
-              </a:rPr>
-              <a:t>TBD – North Carolina Data set – Jimmy/Hector/Zehra to populate</a:t>
-            </a:r>
-            <a:endParaRPr lang="en-US" sz="1200" dirty="0"/>
+              <a:rPr lang="en-US" sz="1200" i="1" dirty="0"/>
+              <a:t>	North Carolina metropolitan area Twitter trends are likely consistent with those of other metropolitan areas in the US, however, as the team did 	not sample rural counties, an assessment cannot be made as to whether NC is a good representation of the country as a whole. </a:t>
+            </a:r>
           </a:p>
           <a:p>
             <a:pPr>
@@ -9002,90 +8588,6 @@
       </p:sp>
       <p:sp>
         <p:nvSpPr>
-          <p:cNvPr id="4" name="Content Placeholder 3">
-            <a:extLst>
-              <a:ext uri="{FF2B5EF4-FFF2-40B4-BE49-F238E27FC236}">
-                <a16:creationId xmlns:a16="http://schemas.microsoft.com/office/drawing/2014/main" id="{0EEEF047-177A-4F9A-987B-62DADBC96BAA}"/>
-              </a:ext>
-            </a:extLst>
-          </p:cNvPr>
-          <p:cNvSpPr>
-            <a:spLocks noGrp="1"/>
-          </p:cNvSpPr>
-          <p:nvPr>
-            <p:ph sz="half" idx="1"/>
-          </p:nvPr>
-        </p:nvSpPr>
-        <p:spPr>
-          <a:xfrm>
-            <a:off x="362222" y="1325052"/>
-            <a:ext cx="6614650" cy="5229170"/>
-          </a:xfrm>
-        </p:spPr>
-        <p:txBody>
-          <a:bodyPr/>
-          <a:lstStyle/>
-          <a:p>
-            <a:pPr marL="0" indent="0">
-              <a:buNone/>
-            </a:pPr>
-            <a:r>
-              <a:rPr lang="en-US" b="1" dirty="0"/>
-              <a:t>1) Data from the Twitter API</a:t>
-            </a:r>
-          </a:p>
-          <a:p>
-            <a:pPr>
-              <a:buAutoNum type="arabicParenR"/>
-            </a:pPr>
-            <a:endParaRPr lang="en-US" sz="2800" b="1" dirty="0"/>
-          </a:p>
-          <a:p>
-            <a:pPr marL="0" indent="0">
-              <a:buNone/>
-            </a:pPr>
-            <a:endParaRPr lang="en-US" sz="2800" b="1" dirty="0"/>
-          </a:p>
-          <a:p>
-            <a:pPr marL="0" indent="0">
-              <a:buNone/>
-            </a:pPr>
-            <a:endParaRPr lang="en-US" sz="2800" b="1" dirty="0"/>
-          </a:p>
-          <a:p>
-            <a:pPr marL="0" indent="0">
-              <a:buNone/>
-            </a:pPr>
-            <a:r>
-              <a:rPr lang="en-US" b="1" dirty="0"/>
-              <a:t>2) Data tracking Covid-19 Progression</a:t>
-            </a:r>
-          </a:p>
-          <a:p>
-            <a:pPr marL="0" indent="0">
-              <a:buNone/>
-            </a:pPr>
-            <a:endParaRPr lang="en-US" sz="2400" b="1" dirty="0"/>
-          </a:p>
-          <a:p>
-            <a:pPr marL="0" indent="0">
-              <a:buNone/>
-            </a:pPr>
-            <a:endParaRPr lang="en-US" sz="2400" b="1" dirty="0"/>
-          </a:p>
-          <a:p>
-            <a:pPr marL="0" indent="0">
-              <a:buNone/>
-            </a:pPr>
-            <a:r>
-              <a:rPr lang="en-US" b="1" dirty="0"/>
-              <a:t>3) Geolocation Data from Google</a:t>
-            </a:r>
-          </a:p>
-        </p:txBody>
-      </p:sp>
-      <p:sp>
-        <p:nvSpPr>
           <p:cNvPr id="8" name="TextBox 7">
             <a:extLst>
               <a:ext uri="{FF2B5EF4-FFF2-40B4-BE49-F238E27FC236}">
@@ -9098,7 +8600,7 @@
         </p:nvSpPr>
         <p:spPr>
           <a:xfrm>
-            <a:off x="816235" y="1857310"/>
+            <a:off x="386466" y="1769955"/>
             <a:ext cx="10714349" cy="1077218"/>
           </a:xfrm>
           <a:prstGeom prst="rect">
@@ -9112,12 +8614,15 @@
           </a:bodyPr>
           <a:lstStyle/>
           <a:p>
-            <a:r>
-              <a:rPr lang="en-US" sz="1600" dirty="0"/>
+            <a:pPr marL="0" indent="0">
+              <a:buNone/>
+            </a:pPr>
+            <a:r>
+              <a:rPr lang="en-US" sz="1600" i="1" dirty="0"/>
               <a:t>Data from Twitter was the greatest challenge.  Data in the public domain was either applied a cost, was too large, did not provide enough data, or was split into daily data dumps.  To capture the data required for the project, </a:t>
             </a:r>
             <a:r>
-              <a:rPr lang="en-US" sz="1600" dirty="0">
+              <a:rPr lang="en-US" sz="1600" i="1" dirty="0">
                 <a:solidFill>
                   <a:schemeClr val="accent2"/>
                 </a:solidFill>
@@ -9125,9 +8630,14 @@
               <a:t>a Twitter data scraper was built to retrieve North Carolina data </a:t>
             </a:r>
             <a:r>
-              <a:rPr lang="en-US" sz="1600" dirty="0"/>
+              <a:rPr lang="en-US" sz="1600" i="1" dirty="0"/>
               <a:t>and a Kaggle dataset was used for early global analysis.</a:t>
             </a:r>
+            <a:r>
+              <a:rPr lang="en-US" sz="1600" b="1" dirty="0"/>
+              <a:t> </a:t>
+            </a:r>
+            <a:endParaRPr lang="en-US" sz="1600" i="1" dirty="0"/>
           </a:p>
         </p:txBody>
       </p:sp>
@@ -9145,7 +8655,7 @@
         </p:nvSpPr>
         <p:spPr>
           <a:xfrm>
-            <a:off x="615066" y="3923472"/>
+            <a:off x="418826" y="3765515"/>
             <a:ext cx="10485749" cy="584775"/>
           </a:xfrm>
           <a:prstGeom prst="rect">
@@ -9160,15 +8670,15 @@
           <a:lstStyle/>
           <a:p>
             <a:r>
-              <a:rPr lang="en-US" sz="1600" dirty="0"/>
+              <a:rPr lang="en-US" sz="1600" i="1" dirty="0"/>
               <a:t>Covid-19 data was pulled from two Kaggle data sets.  One from the WHO which tracked early </a:t>
             </a:r>
             <a:r>
-              <a:rPr lang="en-US" sz="1600" dirty="0" err="1"/>
+              <a:rPr lang="en-US" sz="1600" i="1" dirty="0" err="1"/>
               <a:t>Covid</a:t>
             </a:r>
             <a:r>
-              <a:rPr lang="en-US" sz="1600" dirty="0"/>
+              <a:rPr lang="en-US" sz="1600" i="1" dirty="0"/>
               <a:t> cases globally and the second from the New York Times which broke cases down by state and county. </a:t>
             </a:r>
           </a:p>
@@ -9188,8 +8698,8 @@
         </p:nvSpPr>
         <p:spPr>
           <a:xfrm>
-            <a:off x="816235" y="5311271"/>
-            <a:ext cx="10083413" cy="338554"/>
+            <a:off x="475432" y="5311271"/>
+            <a:ext cx="10083413" cy="584775"/>
           </a:xfrm>
           <a:prstGeom prst="rect">
             <a:avLst/>
@@ -9203,28 +8713,8 @@
           <a:lstStyle/>
           <a:p>
             <a:r>
-              <a:rPr lang="en-US" sz="1600" dirty="0">
-                <a:solidFill>
-                  <a:schemeClr val="accent2"/>
-                </a:solidFill>
-              </a:rPr>
-              <a:t>The Google Geolocation API was leveraged to identify  Tweet and </a:t>
-            </a:r>
-            <a:r>
-              <a:rPr lang="en-US" sz="1600" dirty="0" err="1">
-                <a:solidFill>
-                  <a:schemeClr val="accent2"/>
-                </a:solidFill>
-              </a:rPr>
-              <a:t>Covid</a:t>
-            </a:r>
-            <a:r>
-              <a:rPr lang="en-US" sz="1600" dirty="0">
-                <a:solidFill>
-                  <a:schemeClr val="accent2"/>
-                </a:solidFill>
-              </a:rPr>
-              <a:t> case hot spots.</a:t>
+              <a:rPr lang="en-US" sz="1600" i="1" dirty="0"/>
+              <a:t>The Google Geolocation API was leveraged to track increases in Twitter usage during March – May 2020 as Covid-19 case and death count increased in North Carolina major metropolitan areas. </a:t>
             </a:r>
           </a:p>
         </p:txBody>
@@ -9263,6 +8753,120 @@
           <a:lstStyle/>
           <a:p>
             <a:endParaRPr lang="en-US" sz="3600" b="1" dirty="0"/>
+          </a:p>
+        </p:txBody>
+      </p:sp>
+      <p:sp>
+        <p:nvSpPr>
+          <p:cNvPr id="9" name="TextBox 8">
+            <a:extLst>
+              <a:ext uri="{FF2B5EF4-FFF2-40B4-BE49-F238E27FC236}">
+                <a16:creationId xmlns:a16="http://schemas.microsoft.com/office/drawing/2014/main" id="{B81DD8C4-9753-4A28-A32F-9D6EC5F8333C}"/>
+              </a:ext>
+            </a:extLst>
+          </p:cNvPr>
+          <p:cNvSpPr txBox="1"/>
+          <p:nvPr/>
+        </p:nvSpPr>
+        <p:spPr>
+          <a:xfrm>
+            <a:off x="362222" y="1321937"/>
+            <a:ext cx="10196623" cy="338554"/>
+          </a:xfrm>
+          <a:prstGeom prst="rect">
+            <a:avLst/>
+          </a:prstGeom>
+          <a:noFill/>
+        </p:spPr>
+        <p:txBody>
+          <a:bodyPr wrap="square" rtlCol="0">
+            <a:spAutoFit/>
+          </a:bodyPr>
+          <a:lstStyle/>
+          <a:p>
+            <a:pPr marL="0" indent="0">
+              <a:buNone/>
+            </a:pPr>
+            <a:r>
+              <a:rPr lang="en-US" sz="1600" b="1" dirty="0"/>
+              <a:t>1) Data from the Twitter API</a:t>
+            </a:r>
+          </a:p>
+        </p:txBody>
+      </p:sp>
+      <p:sp>
+        <p:nvSpPr>
+          <p:cNvPr id="10" name="TextBox 9">
+            <a:extLst>
+              <a:ext uri="{FF2B5EF4-FFF2-40B4-BE49-F238E27FC236}">
+                <a16:creationId xmlns:a16="http://schemas.microsoft.com/office/drawing/2014/main" id="{0DF7037E-6452-402A-A4BD-736C42D3259D}"/>
+              </a:ext>
+            </a:extLst>
+          </p:cNvPr>
+          <p:cNvSpPr txBox="1"/>
+          <p:nvPr/>
+        </p:nvSpPr>
+        <p:spPr>
+          <a:xfrm>
+            <a:off x="386466" y="3216045"/>
+            <a:ext cx="10196623" cy="338554"/>
+          </a:xfrm>
+          <a:prstGeom prst="rect">
+            <a:avLst/>
+          </a:prstGeom>
+          <a:noFill/>
+        </p:spPr>
+        <p:txBody>
+          <a:bodyPr wrap="square" rtlCol="0">
+            <a:spAutoFit/>
+          </a:bodyPr>
+          <a:lstStyle/>
+          <a:p>
+            <a:pPr marL="0" indent="0">
+              <a:buNone/>
+            </a:pPr>
+            <a:r>
+              <a:rPr lang="en-US" sz="1600" b="1" dirty="0"/>
+              <a:t>2) Data tracking Covid-19 Progression</a:t>
+            </a:r>
+          </a:p>
+        </p:txBody>
+      </p:sp>
+      <p:sp>
+        <p:nvSpPr>
+          <p:cNvPr id="12" name="TextBox 11">
+            <a:extLst>
+              <a:ext uri="{FF2B5EF4-FFF2-40B4-BE49-F238E27FC236}">
+                <a16:creationId xmlns:a16="http://schemas.microsoft.com/office/drawing/2014/main" id="{924FBD66-F44D-471C-AD84-067E4E87C30C}"/>
+              </a:ext>
+            </a:extLst>
+          </p:cNvPr>
+          <p:cNvSpPr txBox="1"/>
+          <p:nvPr/>
+        </p:nvSpPr>
+        <p:spPr>
+          <a:xfrm>
+            <a:off x="418826" y="4893452"/>
+            <a:ext cx="10196623" cy="338554"/>
+          </a:xfrm>
+          <a:prstGeom prst="rect">
+            <a:avLst/>
+          </a:prstGeom>
+          <a:noFill/>
+        </p:spPr>
+        <p:txBody>
+          <a:bodyPr wrap="square" rtlCol="0">
+            <a:spAutoFit/>
+          </a:bodyPr>
+          <a:lstStyle/>
+          <a:p>
+            <a:pPr marL="0" indent="0">
+              <a:buNone/>
+            </a:pPr>
+            <a:r>
+              <a:rPr lang="en-US" sz="1600" b="1" dirty="0"/>
+              <a:t>3) Geolocation Data from Google</a:t>
+            </a:r>
           </a:p>
         </p:txBody>
       </p:sp>
@@ -9338,41 +8942,6 @@
       </p:sp>
       <p:sp>
         <p:nvSpPr>
-          <p:cNvPr id="5" name="TextBox 4">
-            <a:extLst>
-              <a:ext uri="{FF2B5EF4-FFF2-40B4-BE49-F238E27FC236}">
-                <a16:creationId xmlns:a16="http://schemas.microsoft.com/office/drawing/2014/main" id="{FCBEF7D4-C2DB-472B-AAA3-C8F7DA1491A1}"/>
-              </a:ext>
-            </a:extLst>
-          </p:cNvPr>
-          <p:cNvSpPr txBox="1"/>
-          <p:nvPr/>
-        </p:nvSpPr>
-        <p:spPr>
-          <a:xfrm>
-            <a:off x="470144" y="1150568"/>
-            <a:ext cx="10196623" cy="338554"/>
-          </a:xfrm>
-          <a:prstGeom prst="rect">
-            <a:avLst/>
-          </a:prstGeom>
-          <a:noFill/>
-        </p:spPr>
-        <p:txBody>
-          <a:bodyPr wrap="square" rtlCol="0">
-            <a:spAutoFit/>
-          </a:bodyPr>
-          <a:lstStyle/>
-          <a:p>
-            <a:r>
-              <a:rPr lang="en-US" sz="1600" b="1" dirty="0"/>
-              <a:t>Exploration Process:</a:t>
-            </a:r>
-          </a:p>
-        </p:txBody>
-      </p:sp>
-      <p:sp>
-        <p:nvSpPr>
           <p:cNvPr id="9" name="Title 1">
             <a:extLst>
               <a:ext uri="{FF2B5EF4-FFF2-40B4-BE49-F238E27FC236}">
@@ -9389,7 +8958,7 @@
         </p:nvSpPr>
         <p:spPr>
           <a:xfrm>
-            <a:off x="534152" y="1489122"/>
+            <a:off x="534152" y="1271529"/>
             <a:ext cx="11343904" cy="1135299"/>
           </a:xfrm>
         </p:spPr>
@@ -9401,129 +8970,51 @@
           <a:p>
             <a:pPr lvl="0"/>
             <a:r>
-              <a:rPr lang="en-US" sz="1400" i="1" dirty="0">
+              <a:rPr lang="en-US" sz="1600" i="1" dirty="0">
                 <a:solidFill>
                   <a:srgbClr val="FFFFFF"/>
                 </a:solidFill>
               </a:rPr>
-              <a:t>Significant time was spent locating Twitter data. Twitter requires paid use of its API to source portions of the data we wanted for our original assessment.  Even with the limit of data that could be pulled, each month, day, even hour would churn so many tweets about </a:t>
-            </a:r>
-            <a:r>
-              <a:rPr lang="en-US" sz="1400" i="1" dirty="0" err="1">
-                <a:solidFill>
-                  <a:srgbClr val="FFFFFF"/>
-                </a:solidFill>
-              </a:rPr>
-              <a:t>Covid</a:t>
-            </a:r>
-            <a:r>
-              <a:rPr lang="en-US" sz="1400" i="1" dirty="0">
-                <a:solidFill>
-                  <a:srgbClr val="FFFFFF"/>
-                </a:solidFill>
-              </a:rPr>
-              <a:t> once the pandemic progressed that there was not sufficient time to download the information.  </a:t>
-            </a:r>
-            <a:r>
-              <a:rPr lang="en-US" sz="1400" i="1" dirty="0">
-                <a:solidFill>
-                  <a:schemeClr val="accent2"/>
-                </a:solidFill>
-              </a:rPr>
-              <a:t>A data scraper was created to limit the data pulled back from the API. </a:t>
-            </a:r>
-          </a:p>
-        </p:txBody>
-      </p:sp>
-      <p:sp>
-        <p:nvSpPr>
-          <p:cNvPr id="7" name="Rectangle 6">
+              <a:t>Significant time was allocated to identifying appropriate Twitter datasets .  The team struggled to find a “Goldilocks” data set that was not too large, too small, or required a paid API subscription.  This culminated with the creation of a data scraper from the Twitter API which pulled tweet information from North Carolina metropolitan areas during March-May 2020.  Multiple CSV files were merged and then filtering applied to enable geocoding from the Google API. </a:t>
+            </a:r>
+            <a:endParaRPr lang="en-US" sz="1600" i="1" dirty="0">
+              <a:solidFill>
+                <a:schemeClr val="accent2"/>
+              </a:solidFill>
+            </a:endParaRPr>
+          </a:p>
+        </p:txBody>
+      </p:sp>
+      <p:pic>
+        <p:nvPicPr>
+          <p:cNvPr id="4" name="Picture 3">
             <a:extLst>
               <a:ext uri="{FF2B5EF4-FFF2-40B4-BE49-F238E27FC236}">
-                <a16:creationId xmlns:a16="http://schemas.microsoft.com/office/drawing/2014/main" id="{94F01375-5140-490D-ACAA-01E72B81D79C}"/>
+                <a16:creationId xmlns:a16="http://schemas.microsoft.com/office/drawing/2014/main" id="{C8A55374-20B2-4C99-9C78-4C7944274095}"/>
               </a:ext>
             </a:extLst>
           </p:cNvPr>
-          <p:cNvSpPr/>
+          <p:cNvPicPr>
+            <a:picLocks noChangeAspect="1"/>
+          </p:cNvPicPr>
           <p:nvPr/>
-        </p:nvSpPr>
-        <p:spPr>
-          <a:xfrm>
-            <a:off x="387472" y="2624420"/>
-            <a:ext cx="11417056" cy="3846167"/>
+        </p:nvPicPr>
+        <p:blipFill>
+          <a:blip r:embed="rId2"/>
+          <a:stretch>
+            <a:fillRect/>
+          </a:stretch>
+        </p:blipFill>
+        <p:spPr>
+          <a:xfrm>
+            <a:off x="908824" y="2555114"/>
+            <a:ext cx="10374351" cy="4026006"/>
           </a:xfrm>
           <a:prstGeom prst="rect">
             <a:avLst/>
           </a:prstGeom>
-          <a:solidFill>
-            <a:schemeClr val="tx1"/>
-          </a:solidFill>
-        </p:spPr>
-        <p:style>
-          <a:lnRef idx="2">
-            <a:schemeClr val="accent1">
-              <a:shade val="50000"/>
-            </a:schemeClr>
-          </a:lnRef>
-          <a:fillRef idx="1">
-            <a:schemeClr val="accent1"/>
-          </a:fillRef>
-          <a:effectRef idx="0">
-            <a:schemeClr val="accent1"/>
-          </a:effectRef>
-          <a:fontRef idx="minor">
-            <a:schemeClr val="lt1"/>
-          </a:fontRef>
-        </p:style>
-        <p:txBody>
-          <a:bodyPr rtlCol="0" anchor="ctr"/>
-          <a:lstStyle/>
-          <a:p>
-            <a:pPr algn="ctr"/>
-            <a:endParaRPr lang="en-US"/>
-          </a:p>
-        </p:txBody>
-      </p:sp>
-      <p:sp>
-        <p:nvSpPr>
-          <p:cNvPr id="10" name="TextBox 9">
-            <a:extLst>
-              <a:ext uri="{FF2B5EF4-FFF2-40B4-BE49-F238E27FC236}">
-                <a16:creationId xmlns:a16="http://schemas.microsoft.com/office/drawing/2014/main" id="{8D5F9014-E393-4A82-807A-7E55F7436ECB}"/>
-              </a:ext>
-            </a:extLst>
-          </p:cNvPr>
-          <p:cNvSpPr txBox="1"/>
-          <p:nvPr/>
-        </p:nvSpPr>
-        <p:spPr>
-          <a:xfrm>
-            <a:off x="1143000" y="2852928"/>
-            <a:ext cx="9838944" cy="369332"/>
-          </a:xfrm>
-          <a:prstGeom prst="rect">
-            <a:avLst/>
-          </a:prstGeom>
-          <a:noFill/>
-        </p:spPr>
-        <p:txBody>
-          <a:bodyPr wrap="square" rtlCol="0">
-            <a:spAutoFit/>
-          </a:bodyPr>
-          <a:lstStyle/>
-          <a:p>
-            <a:pPr algn="ctr"/>
-            <a:r>
-              <a:rPr lang="en-US" dirty="0">
-                <a:solidFill>
-                  <a:schemeClr val="accent2"/>
-                </a:solidFill>
-              </a:rPr>
-              <a:t>Input Sample of Jimmy’s Twitter API Code</a:t>
-            </a:r>
-          </a:p>
-        </p:txBody>
-      </p:sp>
+        </p:spPr>
+      </p:pic>
     </p:spTree>
     <p:extLst>
       <p:ext uri="{BB962C8B-B14F-4D97-AF65-F5344CB8AC3E}">
@@ -9612,8 +9103,8 @@
         </p:nvSpPr>
         <p:spPr>
           <a:xfrm>
-            <a:off x="424048" y="3194809"/>
-            <a:ext cx="11343904" cy="687837"/>
+            <a:off x="424048" y="1242222"/>
+            <a:ext cx="11343904" cy="951211"/>
           </a:xfrm>
         </p:spPr>
         <p:txBody>
@@ -9624,12 +9115,12 @@
           <a:p>
             <a:pPr lvl="0"/>
             <a:r>
-              <a:rPr lang="en-US" sz="1400" i="1" dirty="0">
+              <a:rPr lang="en-US" sz="1600" i="1" dirty="0">
                 <a:solidFill>
                   <a:schemeClr val="tx1"/>
                 </a:solidFill>
               </a:rPr>
-              <a:t>Covid-19 data and early Twitter data presented less of an issue, but there were still a few challenges.  The both data sources  used timestamps next to the date which required removal.  Additionally, months required grouping to ease charting and analysis. </a:t>
+              <a:t>Covid-19 and early Twitter pandemic datasets was cleaner and presented less of a challenge.  The team focused on parsing out data that was not required like timestamps and grouping information into usable chunks.</a:t>
             </a:r>
           </a:p>
         </p:txBody>
@@ -9656,7 +9147,7 @@
         </p:blipFill>
         <p:spPr>
           <a:xfrm>
-            <a:off x="360040" y="3770881"/>
+            <a:off x="313944" y="2050611"/>
             <a:ext cx="11564112" cy="1464167"/>
           </a:xfrm>
           <a:prstGeom prst="rect">
@@ -9664,12 +9155,352 @@
           </a:prstGeom>
         </p:spPr>
       </p:pic>
-      <p:sp>
-        <p:nvSpPr>
-          <p:cNvPr id="16" name="Title 1">
+      <p:pic>
+        <p:nvPicPr>
+          <p:cNvPr id="20" name="Picture 19">
             <a:extLst>
               <a:ext uri="{FF2B5EF4-FFF2-40B4-BE49-F238E27FC236}">
-                <a16:creationId xmlns:a16="http://schemas.microsoft.com/office/drawing/2014/main" id="{C4BCA367-1EA6-4DA7-8947-F6E1A84102AE}"/>
+                <a16:creationId xmlns:a16="http://schemas.microsoft.com/office/drawing/2014/main" id="{AB1F8685-9D8F-46BB-ABCE-755918ACC039}"/>
+              </a:ext>
+            </a:extLst>
+          </p:cNvPr>
+          <p:cNvPicPr>
+            <a:picLocks noChangeAspect="1"/>
+          </p:cNvPicPr>
+          <p:nvPr/>
+        </p:nvPicPr>
+        <p:blipFill>
+          <a:blip r:embed="rId3"/>
+          <a:stretch>
+            <a:fillRect/>
+          </a:stretch>
+        </p:blipFill>
+        <p:spPr>
+          <a:xfrm>
+            <a:off x="313944" y="5302860"/>
+            <a:ext cx="11564112" cy="1167728"/>
+          </a:xfrm>
+          <a:prstGeom prst="rect">
+            <a:avLst/>
+          </a:prstGeom>
+        </p:spPr>
+      </p:pic>
+      <p:pic>
+        <p:nvPicPr>
+          <p:cNvPr id="7" name="Picture 6">
+            <a:extLst>
+              <a:ext uri="{FF2B5EF4-FFF2-40B4-BE49-F238E27FC236}">
+                <a16:creationId xmlns:a16="http://schemas.microsoft.com/office/drawing/2014/main" id="{D4231B50-6A59-46DE-931B-08F605177BA3}"/>
+              </a:ext>
+            </a:extLst>
+          </p:cNvPr>
+          <p:cNvPicPr>
+            <a:picLocks noChangeAspect="1"/>
+          </p:cNvPicPr>
+          <p:nvPr/>
+        </p:nvPicPr>
+        <p:blipFill>
+          <a:blip r:embed="rId4"/>
+          <a:stretch>
+            <a:fillRect/>
+          </a:stretch>
+        </p:blipFill>
+        <p:spPr>
+          <a:xfrm>
+            <a:off x="1191874" y="3692012"/>
+            <a:ext cx="9808252" cy="1433613"/>
+          </a:xfrm>
+          <a:prstGeom prst="rect">
+            <a:avLst/>
+          </a:prstGeom>
+        </p:spPr>
+      </p:pic>
+    </p:spTree>
+    <p:extLst>
+      <p:ext uri="{BB962C8B-B14F-4D97-AF65-F5344CB8AC3E}">
+        <p14:creationId xmlns:p14="http://schemas.microsoft.com/office/powerpoint/2010/main" val="1798042731"/>
+      </p:ext>
+    </p:extLst>
+  </p:cSld>
+  <p:clrMapOvr>
+    <a:masterClrMapping/>
+  </p:clrMapOvr>
+</p:sld>
+</file>
+
+<file path=ppt/slides/slide6.xml><?xml version="1.0" encoding="utf-8"?>
+<p:sld xmlns:a="http://schemas.openxmlformats.org/drawingml/2006/main" xmlns:r="http://schemas.openxmlformats.org/officeDocument/2006/relationships" xmlns:p="http://schemas.openxmlformats.org/presentationml/2006/main">
+  <p:cSld>
+    <p:spTree>
+      <p:nvGrpSpPr>
+        <p:cNvPr id="1" name=""/>
+        <p:cNvGrpSpPr/>
+        <p:nvPr/>
+      </p:nvGrpSpPr>
+      <p:grpSpPr>
+        <a:xfrm>
+          <a:off x="0" y="0"/>
+          <a:ext cx="0" cy="0"/>
+          <a:chOff x="0" y="0"/>
+          <a:chExt cx="0" cy="0"/>
+        </a:xfrm>
+      </p:grpSpPr>
+      <p:sp>
+        <p:nvSpPr>
+          <p:cNvPr id="3" name="TextBox 2">
+            <a:extLst>
+              <a:ext uri="{FF2B5EF4-FFF2-40B4-BE49-F238E27FC236}">
+                <a16:creationId xmlns:a16="http://schemas.microsoft.com/office/drawing/2014/main" id="{5379D1CF-9171-4F6F-AA24-C44140479540}"/>
+              </a:ext>
+            </a:extLst>
+          </p:cNvPr>
+          <p:cNvSpPr txBox="1"/>
+          <p:nvPr/>
+        </p:nvSpPr>
+        <p:spPr>
+          <a:xfrm>
+            <a:off x="534152" y="387412"/>
+            <a:ext cx="9588044" cy="646331"/>
+          </a:xfrm>
+          <a:prstGeom prst="rect">
+            <a:avLst/>
+          </a:prstGeom>
+          <a:noFill/>
+          <a:ln>
+            <a:solidFill>
+              <a:schemeClr val="accent1"/>
+            </a:solidFill>
+          </a:ln>
+        </p:spPr>
+        <p:txBody>
+          <a:bodyPr wrap="square" rtlCol="0">
+            <a:spAutoFit/>
+          </a:bodyPr>
+          <a:lstStyle/>
+          <a:p>
+            <a:r>
+              <a:rPr lang="en-US" sz="3600" b="1" dirty="0"/>
+              <a:t>Data Analysis: </a:t>
+            </a:r>
+          </a:p>
+        </p:txBody>
+      </p:sp>
+      <p:sp>
+        <p:nvSpPr>
+          <p:cNvPr id="5" name="TextBox 4">
+            <a:extLst>
+              <a:ext uri="{FF2B5EF4-FFF2-40B4-BE49-F238E27FC236}">
+                <a16:creationId xmlns:a16="http://schemas.microsoft.com/office/drawing/2014/main" id="{FCBEF7D4-C2DB-472B-AAA3-C8F7DA1491A1}"/>
+              </a:ext>
+            </a:extLst>
+          </p:cNvPr>
+          <p:cNvSpPr txBox="1"/>
+          <p:nvPr/>
+        </p:nvSpPr>
+        <p:spPr>
+          <a:xfrm>
+            <a:off x="470144" y="1092155"/>
+            <a:ext cx="10196623" cy="338554"/>
+          </a:xfrm>
+          <a:prstGeom prst="rect">
+            <a:avLst/>
+          </a:prstGeom>
+          <a:noFill/>
+        </p:spPr>
+        <p:txBody>
+          <a:bodyPr wrap="square" rtlCol="0">
+            <a:spAutoFit/>
+          </a:bodyPr>
+          <a:lstStyle/>
+          <a:p>
+            <a:r>
+              <a:rPr lang="en-US" sz="1600" b="1" dirty="0"/>
+              <a:t>Early Global Covid-19 Progression vs. Twitter:</a:t>
+            </a:r>
+          </a:p>
+        </p:txBody>
+      </p:sp>
+      <p:sp>
+        <p:nvSpPr>
+          <p:cNvPr id="9" name="Title 1">
+            <a:extLst>
+              <a:ext uri="{FF2B5EF4-FFF2-40B4-BE49-F238E27FC236}">
+                <a16:creationId xmlns:a16="http://schemas.microsoft.com/office/drawing/2014/main" id="{C3167C26-EF73-4FB2-B33F-B9B133872235}"/>
+              </a:ext>
+            </a:extLst>
+          </p:cNvPr>
+          <p:cNvSpPr>
+            <a:spLocks noGrp="1"/>
+          </p:cNvSpPr>
+          <p:nvPr>
+            <p:ph type="ctrTitle"/>
+          </p:nvPr>
+        </p:nvSpPr>
+        <p:spPr>
+          <a:xfrm>
+            <a:off x="454793" y="1515647"/>
+            <a:ext cx="11343904" cy="1135299"/>
+          </a:xfrm>
+        </p:spPr>
+        <p:txBody>
+          <a:bodyPr anchor="t" anchorCtr="0">
+            <a:noAutofit/>
+          </a:bodyPr>
+          <a:lstStyle/>
+          <a:p>
+            <a:pPr lvl="0"/>
+            <a:r>
+              <a:rPr lang="en-US" sz="1600" i="1" dirty="0">
+                <a:solidFill>
+                  <a:srgbClr val="FFFFFF"/>
+                </a:solidFill>
+              </a:rPr>
+              <a:t>The first step was to determine how to analyze early global Covid-19 data versus Twitter was to decide which graphical representation clearly reflected data trends.  The conclusion was that bar chart clearly reflected usage spikes on specific days.  The Covid-19 data was then overlayed using a line chart to reflect virus progression.</a:t>
+            </a:r>
+            <a:endParaRPr lang="en-US" sz="1600" i="1" dirty="0">
+              <a:solidFill>
+                <a:schemeClr val="accent2"/>
+              </a:solidFill>
+            </a:endParaRPr>
+          </a:p>
+        </p:txBody>
+      </p:sp>
+      <p:pic>
+        <p:nvPicPr>
+          <p:cNvPr id="4" name="Picture 3">
+            <a:extLst>
+              <a:ext uri="{FF2B5EF4-FFF2-40B4-BE49-F238E27FC236}">
+                <a16:creationId xmlns:a16="http://schemas.microsoft.com/office/drawing/2014/main" id="{C12E3FFD-FC4C-42AC-B412-7CD78803A6AC}"/>
+              </a:ext>
+            </a:extLst>
+          </p:cNvPr>
+          <p:cNvPicPr>
+            <a:picLocks noChangeAspect="1"/>
+          </p:cNvPicPr>
+          <p:nvPr/>
+        </p:nvPicPr>
+        <p:blipFill>
+          <a:blip r:embed="rId2"/>
+          <a:stretch>
+            <a:fillRect/>
+          </a:stretch>
+        </p:blipFill>
+        <p:spPr>
+          <a:xfrm>
+            <a:off x="470144" y="2650946"/>
+            <a:ext cx="6053319" cy="3327589"/>
+          </a:xfrm>
+          <a:prstGeom prst="rect">
+            <a:avLst/>
+          </a:prstGeom>
+        </p:spPr>
+      </p:pic>
+      <p:pic>
+        <p:nvPicPr>
+          <p:cNvPr id="8" name="Picture 7">
+            <a:extLst>
+              <a:ext uri="{FF2B5EF4-FFF2-40B4-BE49-F238E27FC236}">
+                <a16:creationId xmlns:a16="http://schemas.microsoft.com/office/drawing/2014/main" id="{0943D446-ABA7-4E80-ADBC-2120C0D5E83C}"/>
+              </a:ext>
+            </a:extLst>
+          </p:cNvPr>
+          <p:cNvPicPr>
+            <a:picLocks noChangeAspect="1"/>
+          </p:cNvPicPr>
+          <p:nvPr/>
+        </p:nvPicPr>
+        <p:blipFill>
+          <a:blip r:embed="rId3"/>
+          <a:stretch>
+            <a:fillRect/>
+          </a:stretch>
+        </p:blipFill>
+        <p:spPr>
+          <a:xfrm>
+            <a:off x="6661352" y="3590742"/>
+            <a:ext cx="5137345" cy="2734259"/>
+          </a:xfrm>
+          <a:prstGeom prst="rect">
+            <a:avLst/>
+          </a:prstGeom>
+        </p:spPr>
+      </p:pic>
+    </p:spTree>
+    <p:extLst>
+      <p:ext uri="{BB962C8B-B14F-4D97-AF65-F5344CB8AC3E}">
+        <p14:creationId xmlns:p14="http://schemas.microsoft.com/office/powerpoint/2010/main" val="819804979"/>
+      </p:ext>
+    </p:extLst>
+  </p:cSld>
+  <p:clrMapOvr>
+    <a:masterClrMapping/>
+  </p:clrMapOvr>
+</p:sld>
+</file>
+
+<file path=ppt/slides/slide7.xml><?xml version="1.0" encoding="utf-8"?>
+<p:sld xmlns:a="http://schemas.openxmlformats.org/drawingml/2006/main" xmlns:r="http://schemas.openxmlformats.org/officeDocument/2006/relationships" xmlns:p="http://schemas.openxmlformats.org/presentationml/2006/main">
+  <p:cSld>
+    <p:spTree>
+      <p:nvGrpSpPr>
+        <p:cNvPr id="1" name=""/>
+        <p:cNvGrpSpPr/>
+        <p:nvPr/>
+      </p:nvGrpSpPr>
+      <p:grpSpPr>
+        <a:xfrm>
+          <a:off x="0" y="0"/>
+          <a:ext cx="0" cy="0"/>
+          <a:chOff x="0" y="0"/>
+          <a:chExt cx="0" cy="0"/>
+        </a:xfrm>
+      </p:grpSpPr>
+      <p:sp>
+        <p:nvSpPr>
+          <p:cNvPr id="3" name="TextBox 2">
+            <a:extLst>
+              <a:ext uri="{FF2B5EF4-FFF2-40B4-BE49-F238E27FC236}">
+                <a16:creationId xmlns:a16="http://schemas.microsoft.com/office/drawing/2014/main" id="{5379D1CF-9171-4F6F-AA24-C44140479540}"/>
+              </a:ext>
+            </a:extLst>
+          </p:cNvPr>
+          <p:cNvSpPr txBox="1"/>
+          <p:nvPr/>
+        </p:nvSpPr>
+        <p:spPr>
+          <a:xfrm>
+            <a:off x="534152" y="387412"/>
+            <a:ext cx="9588044" cy="646331"/>
+          </a:xfrm>
+          <a:prstGeom prst="rect">
+            <a:avLst/>
+          </a:prstGeom>
+          <a:noFill/>
+          <a:ln>
+            <a:solidFill>
+              <a:schemeClr val="accent1"/>
+            </a:solidFill>
+          </a:ln>
+        </p:spPr>
+        <p:txBody>
+          <a:bodyPr wrap="square" rtlCol="0">
+            <a:spAutoFit/>
+          </a:bodyPr>
+          <a:lstStyle/>
+          <a:p>
+            <a:r>
+              <a:rPr lang="en-US" sz="3600" b="1" dirty="0"/>
+              <a:t>Data Analysis (cont.): </a:t>
+            </a:r>
+          </a:p>
+        </p:txBody>
+      </p:sp>
+      <p:sp>
+        <p:nvSpPr>
+          <p:cNvPr id="11" name="Title 1">
+            <a:extLst>
+              <a:ext uri="{FF2B5EF4-FFF2-40B4-BE49-F238E27FC236}">
+                <a16:creationId xmlns:a16="http://schemas.microsoft.com/office/drawing/2014/main" id="{EBC26554-BD7D-4F63-A075-FC1D6123DE09}"/>
               </a:ext>
             </a:extLst>
           </p:cNvPr>
@@ -9680,8 +9511,8 @@
         </p:nvSpPr>
         <p:spPr>
           <a:xfrm>
-            <a:off x="424048" y="1202526"/>
-            <a:ext cx="11343904" cy="732870"/>
+            <a:off x="389881" y="1442133"/>
+            <a:ext cx="11330052" cy="1442270"/>
           </a:xfrm>
           <a:prstGeom prst="rect">
             <a:avLst/>
@@ -9765,30 +9596,14 @@
           </a:lstStyle>
           <a:p>
             <a:r>
-              <a:rPr lang="en-US" sz="1400" i="1" dirty="0">
+              <a:rPr lang="en-US" sz="1600" i="1" dirty="0">
                 <a:solidFill>
                   <a:srgbClr val="FFFFFF"/>
                 </a:solidFill>
               </a:rPr>
-              <a:t>Twitter’s unpaid offering did not provide geocoordinates.  To use Google </a:t>
-            </a:r>
-            <a:r>
-              <a:rPr lang="en-US" sz="1400" i="1" dirty="0" err="1">
-                <a:solidFill>
-                  <a:srgbClr val="FFFFFF"/>
-                </a:solidFill>
-              </a:rPr>
-              <a:t>Geomaps</a:t>
-            </a:r>
-            <a:r>
-              <a:rPr lang="en-US" sz="1400" i="1" dirty="0">
-                <a:solidFill>
-                  <a:srgbClr val="FFFFFF"/>
-                </a:solidFill>
-              </a:rPr>
-              <a:t> the Twitter location data which required significant cleaning. People weren’t really tweeting from Pluto!</a:t>
-            </a:r>
-            <a:endParaRPr lang="en-US" sz="1400" i="1" dirty="0">
+              <a:t>Twitter activity across major North Carolina population centers was then assessed the Twitter API and Google API to create tweet activity heatmaps.  This was then compared to the Covid-19 progression data set. </a:t>
+            </a:r>
+            <a:endParaRPr lang="en-US" sz="1600" i="1" dirty="0">
               <a:solidFill>
                 <a:schemeClr val="accent2"/>
               </a:solidFill>
@@ -9796,61 +9611,42 @@
           </a:p>
         </p:txBody>
       </p:sp>
-      <p:sp>
-        <p:nvSpPr>
-          <p:cNvPr id="17" name="Rectangle 16">
+      <p:pic>
+        <p:nvPicPr>
+          <p:cNvPr id="12" name="Picture 11">
             <a:extLst>
               <a:ext uri="{FF2B5EF4-FFF2-40B4-BE49-F238E27FC236}">
-                <a16:creationId xmlns:a16="http://schemas.microsoft.com/office/drawing/2014/main" id="{FDD044F9-5DF8-4735-8A54-B6E102A2E20E}"/>
+                <a16:creationId xmlns:a16="http://schemas.microsoft.com/office/drawing/2014/main" id="{F8301709-6872-487E-8E69-CE78A5A7A663}"/>
               </a:ext>
             </a:extLst>
           </p:cNvPr>
-          <p:cNvSpPr/>
+          <p:cNvPicPr>
+            <a:picLocks noChangeAspect="1"/>
+          </p:cNvPicPr>
           <p:nvPr/>
-        </p:nvSpPr>
-        <p:spPr>
-          <a:xfrm>
-            <a:off x="424048" y="1759201"/>
-            <a:ext cx="11417056" cy="1327918"/>
+        </p:nvPicPr>
+        <p:blipFill>
+          <a:blip r:embed="rId2"/>
+          <a:stretch>
+            <a:fillRect/>
+          </a:stretch>
+        </p:blipFill>
+        <p:spPr>
+          <a:xfrm>
+            <a:off x="472067" y="2163267"/>
+            <a:ext cx="6345218" cy="3367737"/>
           </a:xfrm>
           <a:prstGeom prst="rect">
             <a:avLst/>
           </a:prstGeom>
-          <a:solidFill>
-            <a:schemeClr val="tx1"/>
-          </a:solidFill>
-        </p:spPr>
-        <p:style>
-          <a:lnRef idx="2">
-            <a:schemeClr val="accent1">
-              <a:shade val="50000"/>
-            </a:schemeClr>
-          </a:lnRef>
-          <a:fillRef idx="1">
-            <a:schemeClr val="accent1"/>
-          </a:fillRef>
-          <a:effectRef idx="0">
-            <a:schemeClr val="accent1"/>
-          </a:effectRef>
-          <a:fontRef idx="minor">
-            <a:schemeClr val="lt1"/>
-          </a:fontRef>
-        </p:style>
-        <p:txBody>
-          <a:bodyPr rtlCol="0" anchor="ctr"/>
-          <a:lstStyle/>
-          <a:p>
-            <a:pPr algn="ctr"/>
-            <a:endParaRPr lang="en-US"/>
-          </a:p>
-        </p:txBody>
-      </p:sp>
-      <p:sp>
-        <p:nvSpPr>
-          <p:cNvPr id="18" name="TextBox 17">
+        </p:spPr>
+      </p:pic>
+      <p:sp>
+        <p:nvSpPr>
+          <p:cNvPr id="19" name="TextBox 18">
             <a:extLst>
               <a:ext uri="{FF2B5EF4-FFF2-40B4-BE49-F238E27FC236}">
-                <a16:creationId xmlns:a16="http://schemas.microsoft.com/office/drawing/2014/main" id="{069398BE-CE84-406C-BC2A-884EE930A7D3}"/>
+                <a16:creationId xmlns:a16="http://schemas.microsoft.com/office/drawing/2014/main" id="{6CE866D6-797A-4293-83CE-266CCC54027B}"/>
               </a:ext>
             </a:extLst>
           </p:cNvPr>
@@ -9859,8 +9655,8 @@
         </p:nvSpPr>
         <p:spPr>
           <a:xfrm>
-            <a:off x="534152" y="2111590"/>
-            <a:ext cx="9838944" cy="369332"/>
+            <a:off x="389881" y="1118493"/>
+            <a:ext cx="5806199" cy="338554"/>
           </a:xfrm>
           <a:prstGeom prst="rect">
             <a:avLst/>
@@ -9873,14 +9669,9 @@
           </a:bodyPr>
           <a:lstStyle/>
           <a:p>
-            <a:pPr algn="ctr"/>
-            <a:r>
-              <a:rPr lang="en-US" dirty="0">
-                <a:solidFill>
-                  <a:schemeClr val="accent2"/>
-                </a:solidFill>
-              </a:rPr>
-              <a:t>Input Sample of Zehra’s Geolocation Code</a:t>
+            <a:r>
+              <a:rPr lang="en-US" sz="1600" b="1" dirty="0"/>
+              <a:t>North Carolina Covid-19 Progression vs. Twitter Activity:</a:t>
             </a:r>
           </a:p>
         </p:txBody>
@@ -9890,7 +9681,7 @@
           <p:cNvPr id="20" name="Picture 19">
             <a:extLst>
               <a:ext uri="{FF2B5EF4-FFF2-40B4-BE49-F238E27FC236}">
-                <a16:creationId xmlns:a16="http://schemas.microsoft.com/office/drawing/2014/main" id="{AB1F8685-9D8F-46BB-ABCE-755918ACC039}"/>
+                <a16:creationId xmlns:a16="http://schemas.microsoft.com/office/drawing/2014/main" id="{645C013E-C78D-4797-914D-B938002B37AF}"/>
               </a:ext>
             </a:extLst>
           </p:cNvPr>
@@ -9907,186 +9698,20 @@
         </p:blipFill>
         <p:spPr>
           <a:xfrm>
-            <a:off x="360040" y="5423744"/>
-            <a:ext cx="11564112" cy="1167728"/>
+            <a:off x="6984159" y="2705365"/>
+            <a:ext cx="4955667" cy="1997721"/>
           </a:xfrm>
           <a:prstGeom prst="rect">
             <a:avLst/>
           </a:prstGeom>
         </p:spPr>
       </p:pic>
-    </p:spTree>
-    <p:extLst>
-      <p:ext uri="{BB962C8B-B14F-4D97-AF65-F5344CB8AC3E}">
-        <p14:creationId xmlns:p14="http://schemas.microsoft.com/office/powerpoint/2010/main" val="1798042731"/>
-      </p:ext>
-    </p:extLst>
-  </p:cSld>
-  <p:clrMapOvr>
-    <a:masterClrMapping/>
-  </p:clrMapOvr>
-</p:sld>
-</file>
-
-<file path=ppt/slides/slide6.xml><?xml version="1.0" encoding="utf-8"?>
-<p:sld xmlns:a="http://schemas.openxmlformats.org/drawingml/2006/main" xmlns:r="http://schemas.openxmlformats.org/officeDocument/2006/relationships" xmlns:p="http://schemas.openxmlformats.org/presentationml/2006/main">
-  <p:cSld>
-    <p:spTree>
-      <p:nvGrpSpPr>
-        <p:cNvPr id="1" name=""/>
-        <p:cNvGrpSpPr/>
-        <p:nvPr/>
-      </p:nvGrpSpPr>
-      <p:grpSpPr>
-        <a:xfrm>
-          <a:off x="0" y="0"/>
-          <a:ext cx="0" cy="0"/>
-          <a:chOff x="0" y="0"/>
-          <a:chExt cx="0" cy="0"/>
-        </a:xfrm>
-      </p:grpSpPr>
-      <p:sp>
-        <p:nvSpPr>
-          <p:cNvPr id="3" name="TextBox 2">
+      <p:pic>
+        <p:nvPicPr>
+          <p:cNvPr id="21" name="Picture 20">
             <a:extLst>
               <a:ext uri="{FF2B5EF4-FFF2-40B4-BE49-F238E27FC236}">
-                <a16:creationId xmlns:a16="http://schemas.microsoft.com/office/drawing/2014/main" id="{5379D1CF-9171-4F6F-AA24-C44140479540}"/>
-              </a:ext>
-            </a:extLst>
-          </p:cNvPr>
-          <p:cNvSpPr txBox="1"/>
-          <p:nvPr/>
-        </p:nvSpPr>
-        <p:spPr>
-          <a:xfrm>
-            <a:off x="534152" y="387412"/>
-            <a:ext cx="9588044" cy="646331"/>
-          </a:xfrm>
-          <a:prstGeom prst="rect">
-            <a:avLst/>
-          </a:prstGeom>
-          <a:noFill/>
-          <a:ln>
-            <a:solidFill>
-              <a:schemeClr val="accent1"/>
-            </a:solidFill>
-          </a:ln>
-        </p:spPr>
-        <p:txBody>
-          <a:bodyPr wrap="square" rtlCol="0">
-            <a:spAutoFit/>
-          </a:bodyPr>
-          <a:lstStyle/>
-          <a:p>
-            <a:r>
-              <a:rPr lang="en-US" sz="3600" b="1" dirty="0"/>
-              <a:t>Data Analysis: </a:t>
-            </a:r>
-          </a:p>
-        </p:txBody>
-      </p:sp>
-      <p:sp>
-        <p:nvSpPr>
-          <p:cNvPr id="5" name="TextBox 4">
-            <a:extLst>
-              <a:ext uri="{FF2B5EF4-FFF2-40B4-BE49-F238E27FC236}">
-                <a16:creationId xmlns:a16="http://schemas.microsoft.com/office/drawing/2014/main" id="{FCBEF7D4-C2DB-472B-AAA3-C8F7DA1491A1}"/>
-              </a:ext>
-            </a:extLst>
-          </p:cNvPr>
-          <p:cNvSpPr txBox="1"/>
-          <p:nvPr/>
-        </p:nvSpPr>
-        <p:spPr>
-          <a:xfrm>
-            <a:off x="470144" y="1092155"/>
-            <a:ext cx="10196623" cy="338554"/>
-          </a:xfrm>
-          <a:prstGeom prst="rect">
-            <a:avLst/>
-          </a:prstGeom>
-          <a:noFill/>
-        </p:spPr>
-        <p:txBody>
-          <a:bodyPr wrap="square" rtlCol="0">
-            <a:spAutoFit/>
-          </a:bodyPr>
-          <a:lstStyle/>
-          <a:p>
-            <a:r>
-              <a:rPr lang="en-US" sz="1600" b="1" dirty="0"/>
-              <a:t>Early Global Covid-19 Progression vs. Twitter:</a:t>
-            </a:r>
-          </a:p>
-        </p:txBody>
-      </p:sp>
-      <p:sp>
-        <p:nvSpPr>
-          <p:cNvPr id="9" name="Title 1">
-            <a:extLst>
-              <a:ext uri="{FF2B5EF4-FFF2-40B4-BE49-F238E27FC236}">
-                <a16:creationId xmlns:a16="http://schemas.microsoft.com/office/drawing/2014/main" id="{C3167C26-EF73-4FB2-B33F-B9B133872235}"/>
-              </a:ext>
-            </a:extLst>
-          </p:cNvPr>
-          <p:cNvSpPr>
-            <a:spLocks noGrp="1"/>
-          </p:cNvSpPr>
-          <p:nvPr>
-            <p:ph type="ctrTitle"/>
-          </p:nvPr>
-        </p:nvSpPr>
-        <p:spPr>
-          <a:xfrm>
-            <a:off x="454793" y="1515647"/>
-            <a:ext cx="11343904" cy="1135299"/>
-          </a:xfrm>
-        </p:spPr>
-        <p:txBody>
-          <a:bodyPr anchor="t" anchorCtr="0">
-            <a:noAutofit/>
-          </a:bodyPr>
-          <a:lstStyle/>
-          <a:p>
-            <a:pPr lvl="0"/>
-            <a:r>
-              <a:rPr lang="en-US" sz="1400" i="1" dirty="0">
-                <a:solidFill>
-                  <a:srgbClr val="FFFFFF"/>
-                </a:solidFill>
-              </a:rPr>
-              <a:t>When analyzing the early global </a:t>
-            </a:r>
-            <a:r>
-              <a:rPr lang="en-US" sz="1400" i="1" dirty="0" err="1">
-                <a:solidFill>
-                  <a:srgbClr val="FFFFFF"/>
-                </a:solidFill>
-              </a:rPr>
-              <a:t>Covid</a:t>
-            </a:r>
-            <a:r>
-              <a:rPr lang="en-US" sz="1400" i="1" dirty="0">
-                <a:solidFill>
-                  <a:srgbClr val="FFFFFF"/>
-                </a:solidFill>
-              </a:rPr>
-              <a:t> data set versus the Twitter results, the first step was to determine which method would most clearly show any trends in Twitter data.  This ended up being the bar chart as usage spikes were exceptionally clear.  Then we had to decide how best to overlay the Covid-19 data to reflect that virus progression was not the main contributor to increases in Twitter usage.  This was a line chart. </a:t>
-            </a:r>
-            <a:endParaRPr lang="en-US" sz="1400" i="1" dirty="0">
-              <a:solidFill>
-                <a:schemeClr val="accent2"/>
-              </a:solidFill>
-            </a:endParaRPr>
-          </a:p>
-        </p:txBody>
-      </p:sp>
-      <p:pic>
-        <p:nvPicPr>
-          <p:cNvPr id="4" name="Picture 3">
-            <a:extLst>
-              <a:ext uri="{FF2B5EF4-FFF2-40B4-BE49-F238E27FC236}">
-                <a16:creationId xmlns:a16="http://schemas.microsoft.com/office/drawing/2014/main" id="{C12E3FFD-FC4C-42AC-B412-7CD78803A6AC}"/>
+                <a16:creationId xmlns:a16="http://schemas.microsoft.com/office/drawing/2014/main" id="{05B10D0D-2F24-4F0E-8A63-A2A3397C5743}"/>
               </a:ext>
             </a:extLst>
           </p:cNvPr>
@@ -10096,45 +9721,15 @@
           <p:nvPr/>
         </p:nvPicPr>
         <p:blipFill>
-          <a:blip r:embed="rId2"/>
+          <a:blip r:embed="rId4"/>
           <a:stretch>
             <a:fillRect/>
           </a:stretch>
         </p:blipFill>
         <p:spPr>
           <a:xfrm>
-            <a:off x="470144" y="2650946"/>
-            <a:ext cx="6173723" cy="3393777"/>
-          </a:xfrm>
-          <a:prstGeom prst="rect">
-            <a:avLst/>
-          </a:prstGeom>
-        </p:spPr>
-      </p:pic>
-      <p:pic>
-        <p:nvPicPr>
-          <p:cNvPr id="8" name="Picture 7">
-            <a:extLst>
-              <a:ext uri="{FF2B5EF4-FFF2-40B4-BE49-F238E27FC236}">
-                <a16:creationId xmlns:a16="http://schemas.microsoft.com/office/drawing/2014/main" id="{0943D446-ABA7-4E80-ADBC-2120C0D5E83C}"/>
-              </a:ext>
-            </a:extLst>
-          </p:cNvPr>
-          <p:cNvPicPr>
-            <a:picLocks noChangeAspect="1"/>
-          </p:cNvPicPr>
-          <p:nvPr/>
-        </p:nvPicPr>
-        <p:blipFill>
-          <a:blip r:embed="rId3"/>
-          <a:stretch>
-            <a:fillRect/>
-          </a:stretch>
-        </p:blipFill>
-        <p:spPr>
-          <a:xfrm>
-            <a:off x="6918849" y="3691104"/>
-            <a:ext cx="5137345" cy="2734259"/>
+            <a:off x="495426" y="5739507"/>
+            <a:ext cx="11201148" cy="927573"/>
           </a:xfrm>
           <a:prstGeom prst="rect">
             <a:avLst/>
@@ -10144,273 +9739,7 @@
     </p:spTree>
     <p:extLst>
       <p:ext uri="{BB962C8B-B14F-4D97-AF65-F5344CB8AC3E}">
-        <p14:creationId xmlns:p14="http://schemas.microsoft.com/office/powerpoint/2010/main" val="819804979"/>
-      </p:ext>
-    </p:extLst>
-  </p:cSld>
-  <p:clrMapOvr>
-    <a:masterClrMapping/>
-  </p:clrMapOvr>
-</p:sld>
-</file>
-
-<file path=ppt/slides/slide7.xml><?xml version="1.0" encoding="utf-8"?>
-<p:sld xmlns:a="http://schemas.openxmlformats.org/drawingml/2006/main" xmlns:r="http://schemas.openxmlformats.org/officeDocument/2006/relationships" xmlns:p="http://schemas.openxmlformats.org/presentationml/2006/main">
-  <p:cSld>
-    <p:spTree>
-      <p:nvGrpSpPr>
-        <p:cNvPr id="1" name=""/>
-        <p:cNvGrpSpPr/>
-        <p:nvPr/>
-      </p:nvGrpSpPr>
-      <p:grpSpPr>
-        <a:xfrm>
-          <a:off x="0" y="0"/>
-          <a:ext cx="0" cy="0"/>
-          <a:chOff x="0" y="0"/>
-          <a:chExt cx="0" cy="0"/>
-        </a:xfrm>
-      </p:grpSpPr>
-      <p:sp>
-        <p:nvSpPr>
-          <p:cNvPr id="3" name="TextBox 2">
-            <a:extLst>
-              <a:ext uri="{FF2B5EF4-FFF2-40B4-BE49-F238E27FC236}">
-                <a16:creationId xmlns:a16="http://schemas.microsoft.com/office/drawing/2014/main" id="{5379D1CF-9171-4F6F-AA24-C44140479540}"/>
-              </a:ext>
-            </a:extLst>
-          </p:cNvPr>
-          <p:cNvSpPr txBox="1"/>
-          <p:nvPr/>
-        </p:nvSpPr>
-        <p:spPr>
-          <a:xfrm>
-            <a:off x="534152" y="387412"/>
-            <a:ext cx="9588044" cy="646331"/>
-          </a:xfrm>
-          <a:prstGeom prst="rect">
-            <a:avLst/>
-          </a:prstGeom>
-          <a:noFill/>
-          <a:ln>
-            <a:solidFill>
-              <a:schemeClr val="accent1"/>
-            </a:solidFill>
-          </a:ln>
-        </p:spPr>
-        <p:txBody>
-          <a:bodyPr wrap="square" rtlCol="0">
-            <a:spAutoFit/>
-          </a:bodyPr>
-          <a:lstStyle/>
-          <a:p>
-            <a:r>
-              <a:rPr lang="en-US" sz="3600" b="1" dirty="0"/>
-              <a:t>Data Analysis (cont.): </a:t>
-            </a:r>
-          </a:p>
-        </p:txBody>
-      </p:sp>
-      <p:sp>
-        <p:nvSpPr>
-          <p:cNvPr id="5" name="TextBox 4">
-            <a:extLst>
-              <a:ext uri="{FF2B5EF4-FFF2-40B4-BE49-F238E27FC236}">
-                <a16:creationId xmlns:a16="http://schemas.microsoft.com/office/drawing/2014/main" id="{FCBEF7D4-C2DB-472B-AAA3-C8F7DA1491A1}"/>
-              </a:ext>
-            </a:extLst>
-          </p:cNvPr>
-          <p:cNvSpPr txBox="1"/>
-          <p:nvPr/>
-        </p:nvSpPr>
-        <p:spPr>
-          <a:xfrm>
-            <a:off x="470144" y="1092155"/>
-            <a:ext cx="10196623" cy="338554"/>
-          </a:xfrm>
-          <a:prstGeom prst="rect">
-            <a:avLst/>
-          </a:prstGeom>
-          <a:noFill/>
-        </p:spPr>
-        <p:txBody>
-          <a:bodyPr wrap="square" rtlCol="0">
-            <a:spAutoFit/>
-          </a:bodyPr>
-          <a:lstStyle/>
-          <a:p>
-            <a:r>
-              <a:rPr lang="en-US" sz="1600" b="1" dirty="0"/>
-              <a:t>Covid-19 Rise in North Carolina vs. Twitter Geocoding:</a:t>
-            </a:r>
-          </a:p>
-        </p:txBody>
-      </p:sp>
-      <p:sp>
-        <p:nvSpPr>
-          <p:cNvPr id="9" name="Title 1">
-            <a:extLst>
-              <a:ext uri="{FF2B5EF4-FFF2-40B4-BE49-F238E27FC236}">
-                <a16:creationId xmlns:a16="http://schemas.microsoft.com/office/drawing/2014/main" id="{C3167C26-EF73-4FB2-B33F-B9B133872235}"/>
-              </a:ext>
-            </a:extLst>
-          </p:cNvPr>
-          <p:cNvSpPr>
-            <a:spLocks noGrp="1"/>
-          </p:cNvSpPr>
-          <p:nvPr>
-            <p:ph type="ctrTitle"/>
-          </p:nvPr>
-        </p:nvSpPr>
-        <p:spPr>
-          <a:xfrm>
-            <a:off x="454793" y="1515647"/>
-            <a:ext cx="11343904" cy="1135299"/>
-          </a:xfrm>
-        </p:spPr>
-        <p:txBody>
-          <a:bodyPr anchor="t" anchorCtr="0">
-            <a:noAutofit/>
-          </a:bodyPr>
-          <a:lstStyle/>
-          <a:p>
-            <a:r>
-              <a:rPr lang="en-US" sz="1400" i="1" dirty="0">
-                <a:solidFill>
-                  <a:schemeClr val="tx1"/>
-                </a:solidFill>
-              </a:rPr>
-              <a:t>The scope of NC Covid-19 during the March 2020 – May 2020 was significant.  As a result, the </a:t>
-            </a:r>
-            <a:r>
-              <a:rPr lang="en-US" sz="1400" dirty="0">
-                <a:solidFill>
-                  <a:schemeClr val="tx1"/>
-                </a:solidFill>
-                <a:effectLst/>
-              </a:rPr>
-              <a:t>team </a:t>
-            </a:r>
-            <a:r>
-              <a:rPr lang="en-US" sz="1400" dirty="0">
-                <a:solidFill>
-                  <a:schemeClr val="tx1"/>
-                </a:solidFill>
-              </a:rPr>
-              <a:t>narrowed it to </a:t>
-            </a:r>
-            <a:r>
-              <a:rPr lang="en-US" sz="1400" dirty="0">
-                <a:solidFill>
-                  <a:schemeClr val="tx1"/>
-                </a:solidFill>
-                <a:effectLst/>
-              </a:rPr>
-              <a:t>Mecklenburg, Wake, and Buncombe as these represented largest population centers. </a:t>
-            </a:r>
-            <a:br>
-              <a:rPr lang="en-US" sz="1400" dirty="0">
-                <a:effectLst/>
-              </a:rPr>
-            </a:br>
-            <a:br>
-              <a:rPr lang="en-US" sz="1400" dirty="0">
-                <a:effectLst/>
-              </a:rPr>
-            </a:br>
-            <a:br>
-              <a:rPr lang="en-US" sz="1400" dirty="0">
-                <a:effectLst/>
-              </a:rPr>
-            </a:br>
-            <a:r>
-              <a:rPr lang="en-US" sz="1400" dirty="0">
-                <a:effectLst/>
-              </a:rPr>
-              <a:t> </a:t>
-            </a:r>
-            <a:endParaRPr lang="en-US" sz="1400" i="1" dirty="0">
-              <a:solidFill>
-                <a:schemeClr val="accent2"/>
-              </a:solidFill>
-            </a:endParaRPr>
-          </a:p>
-        </p:txBody>
-      </p:sp>
-      <p:pic>
-        <p:nvPicPr>
-          <p:cNvPr id="6" name="Picture 5">
-            <a:extLst>
-              <a:ext uri="{FF2B5EF4-FFF2-40B4-BE49-F238E27FC236}">
-                <a16:creationId xmlns:a16="http://schemas.microsoft.com/office/drawing/2014/main" id="{3165988E-8B04-4BD5-BBDD-BD795A6F0320}"/>
-              </a:ext>
-            </a:extLst>
-          </p:cNvPr>
-          <p:cNvPicPr>
-            <a:picLocks noChangeAspect="1"/>
-          </p:cNvPicPr>
-          <p:nvPr/>
-        </p:nvPicPr>
-        <p:blipFill>
-          <a:blip r:embed="rId2"/>
-          <a:stretch>
-            <a:fillRect/>
-          </a:stretch>
-        </p:blipFill>
-        <p:spPr>
-          <a:xfrm>
-            <a:off x="470144" y="2157881"/>
-            <a:ext cx="10978906" cy="909169"/>
-          </a:xfrm>
-          <a:prstGeom prst="rect">
-            <a:avLst/>
-          </a:prstGeom>
-        </p:spPr>
-      </p:pic>
-      <p:sp>
-        <p:nvSpPr>
-          <p:cNvPr id="7" name="TextBox 6">
-            <a:extLst>
-              <a:ext uri="{FF2B5EF4-FFF2-40B4-BE49-F238E27FC236}">
-                <a16:creationId xmlns:a16="http://schemas.microsoft.com/office/drawing/2014/main" id="{25EC42DC-0DE5-4836-AE54-77A6699D3047}"/>
-              </a:ext>
-            </a:extLst>
-          </p:cNvPr>
-          <p:cNvSpPr txBox="1"/>
-          <p:nvPr/>
-        </p:nvSpPr>
-        <p:spPr>
-          <a:xfrm>
-            <a:off x="454793" y="3244334"/>
-            <a:ext cx="8134350" cy="369332"/>
-          </a:xfrm>
-          <a:prstGeom prst="rect">
-            <a:avLst/>
-          </a:prstGeom>
-          <a:noFill/>
-        </p:spPr>
-        <p:txBody>
-          <a:bodyPr wrap="square" rtlCol="0">
-            <a:spAutoFit/>
-          </a:bodyPr>
-          <a:lstStyle/>
-          <a:p>
-            <a:r>
-              <a:rPr lang="en-US" sz="1800" i="1" dirty="0">
-                <a:solidFill>
-                  <a:schemeClr val="accent2"/>
-                </a:solidFill>
-              </a:rPr>
-              <a:t>Input Analysis – Zehra</a:t>
-            </a:r>
-            <a:endParaRPr lang="en-US" dirty="0"/>
-          </a:p>
-        </p:txBody>
-      </p:sp>
-    </p:spTree>
-    <p:extLst>
-      <p:ext uri="{BB962C8B-B14F-4D97-AF65-F5344CB8AC3E}">
-        <p14:creationId xmlns:p14="http://schemas.microsoft.com/office/powerpoint/2010/main" val="698855361"/>
+        <p14:creationId xmlns:p14="http://schemas.microsoft.com/office/powerpoint/2010/main" val="3448444839"/>
       </p:ext>
     </p:extLst>
   </p:cSld>
@@ -10421,151 +9750,6 @@
 </file>
 
 <file path=ppt/slides/slide8.xml><?xml version="1.0" encoding="utf-8"?>
-<p:sld xmlns:a="http://schemas.openxmlformats.org/drawingml/2006/main" xmlns:r="http://schemas.openxmlformats.org/officeDocument/2006/relationships" xmlns:p="http://schemas.openxmlformats.org/presentationml/2006/main">
-  <p:cSld>
-    <p:spTree>
-      <p:nvGrpSpPr>
-        <p:cNvPr id="1" name=""/>
-        <p:cNvGrpSpPr/>
-        <p:nvPr/>
-      </p:nvGrpSpPr>
-      <p:grpSpPr>
-        <a:xfrm>
-          <a:off x="0" y="0"/>
-          <a:ext cx="0" cy="0"/>
-          <a:chOff x="0" y="0"/>
-          <a:chExt cx="0" cy="0"/>
-        </a:xfrm>
-      </p:grpSpPr>
-      <p:sp>
-        <p:nvSpPr>
-          <p:cNvPr id="3" name="TextBox 2">
-            <a:extLst>
-              <a:ext uri="{FF2B5EF4-FFF2-40B4-BE49-F238E27FC236}">
-                <a16:creationId xmlns:a16="http://schemas.microsoft.com/office/drawing/2014/main" id="{5379D1CF-9171-4F6F-AA24-C44140479540}"/>
-              </a:ext>
-            </a:extLst>
-          </p:cNvPr>
-          <p:cNvSpPr txBox="1"/>
-          <p:nvPr/>
-        </p:nvSpPr>
-        <p:spPr>
-          <a:xfrm>
-            <a:off x="534152" y="387412"/>
-            <a:ext cx="9588044" cy="646331"/>
-          </a:xfrm>
-          <a:prstGeom prst="rect">
-            <a:avLst/>
-          </a:prstGeom>
-          <a:noFill/>
-          <a:ln>
-            <a:solidFill>
-              <a:schemeClr val="accent1"/>
-            </a:solidFill>
-          </a:ln>
-        </p:spPr>
-        <p:txBody>
-          <a:bodyPr wrap="square" rtlCol="0">
-            <a:spAutoFit/>
-          </a:bodyPr>
-          <a:lstStyle/>
-          <a:p>
-            <a:r>
-              <a:rPr lang="en-US" sz="3600" b="1" dirty="0"/>
-              <a:t>Data Analysis (cont.): </a:t>
-            </a:r>
-          </a:p>
-        </p:txBody>
-      </p:sp>
-      <p:sp>
-        <p:nvSpPr>
-          <p:cNvPr id="5" name="TextBox 4">
-            <a:extLst>
-              <a:ext uri="{FF2B5EF4-FFF2-40B4-BE49-F238E27FC236}">
-                <a16:creationId xmlns:a16="http://schemas.microsoft.com/office/drawing/2014/main" id="{FCBEF7D4-C2DB-472B-AAA3-C8F7DA1491A1}"/>
-              </a:ext>
-            </a:extLst>
-          </p:cNvPr>
-          <p:cNvSpPr txBox="1"/>
-          <p:nvPr/>
-        </p:nvSpPr>
-        <p:spPr>
-          <a:xfrm>
-            <a:off x="470144" y="1092155"/>
-            <a:ext cx="10196623" cy="338554"/>
-          </a:xfrm>
-          <a:prstGeom prst="rect">
-            <a:avLst/>
-          </a:prstGeom>
-          <a:noFill/>
-        </p:spPr>
-        <p:txBody>
-          <a:bodyPr wrap="square" rtlCol="0">
-            <a:spAutoFit/>
-          </a:bodyPr>
-          <a:lstStyle/>
-          <a:p>
-            <a:r>
-              <a:rPr lang="en-US" sz="1600" b="1" dirty="0"/>
-              <a:t>North Carolina Twitter Data vs. Covid-19 Progression:</a:t>
-            </a:r>
-          </a:p>
-        </p:txBody>
-      </p:sp>
-      <p:sp>
-        <p:nvSpPr>
-          <p:cNvPr id="9" name="Title 1">
-            <a:extLst>
-              <a:ext uri="{FF2B5EF4-FFF2-40B4-BE49-F238E27FC236}">
-                <a16:creationId xmlns:a16="http://schemas.microsoft.com/office/drawing/2014/main" id="{C3167C26-EF73-4FB2-B33F-B9B133872235}"/>
-              </a:ext>
-            </a:extLst>
-          </p:cNvPr>
-          <p:cNvSpPr>
-            <a:spLocks noGrp="1"/>
-          </p:cNvSpPr>
-          <p:nvPr>
-            <p:ph type="ctrTitle"/>
-          </p:nvPr>
-        </p:nvSpPr>
-        <p:spPr>
-          <a:xfrm>
-            <a:off x="454793" y="1515647"/>
-            <a:ext cx="11343904" cy="1135299"/>
-          </a:xfrm>
-        </p:spPr>
-        <p:txBody>
-          <a:bodyPr anchor="t" anchorCtr="0">
-            <a:noAutofit/>
-          </a:bodyPr>
-          <a:lstStyle/>
-          <a:p>
-            <a:pPr lvl="0"/>
-            <a:r>
-              <a:rPr lang="en-US" sz="1400" i="1" dirty="0">
-                <a:solidFill>
-                  <a:schemeClr val="accent2"/>
-                </a:solidFill>
-              </a:rPr>
-              <a:t>Input Analysis - Jimmy</a:t>
-            </a:r>
-          </a:p>
-        </p:txBody>
-      </p:sp>
-    </p:spTree>
-    <p:extLst>
-      <p:ext uri="{BB962C8B-B14F-4D97-AF65-F5344CB8AC3E}">
-        <p14:creationId xmlns:p14="http://schemas.microsoft.com/office/powerpoint/2010/main" val="481425335"/>
-      </p:ext>
-    </p:extLst>
-  </p:cSld>
-  <p:clrMapOvr>
-    <a:masterClrMapping/>
-  </p:clrMapOvr>
-</p:sld>
-</file>
-
-<file path=ppt/slides/slide9.xml><?xml version="1.0" encoding="utf-8"?>
 <p:sld xmlns:a="http://schemas.openxmlformats.org/drawingml/2006/main" xmlns:r="http://schemas.openxmlformats.org/officeDocument/2006/relationships" xmlns:p="http://schemas.openxmlformats.org/presentationml/2006/main">
   <p:cSld>
     <p:spTree>
@@ -10888,6 +10072,265 @@
     <p:extLst>
       <p:ext uri="{BB962C8B-B14F-4D97-AF65-F5344CB8AC3E}">
         <p14:creationId xmlns:p14="http://schemas.microsoft.com/office/powerpoint/2010/main" val="1523662709"/>
+      </p:ext>
+    </p:extLst>
+  </p:cSld>
+  <p:clrMapOvr>
+    <a:masterClrMapping/>
+  </p:clrMapOvr>
+</p:sld>
+</file>
+
+<file path=ppt/slides/slide9.xml><?xml version="1.0" encoding="utf-8"?>
+<p:sld xmlns:a="http://schemas.openxmlformats.org/drawingml/2006/main" xmlns:r="http://schemas.openxmlformats.org/officeDocument/2006/relationships" xmlns:p="http://schemas.openxmlformats.org/presentationml/2006/main">
+  <p:cSld>
+    <p:spTree>
+      <p:nvGrpSpPr>
+        <p:cNvPr id="1" name=""/>
+        <p:cNvGrpSpPr/>
+        <p:nvPr/>
+      </p:nvGrpSpPr>
+      <p:grpSpPr>
+        <a:xfrm>
+          <a:off x="0" y="0"/>
+          <a:ext cx="0" cy="0"/>
+          <a:chOff x="0" y="0"/>
+          <a:chExt cx="0" cy="0"/>
+        </a:xfrm>
+      </p:grpSpPr>
+      <p:sp>
+        <p:nvSpPr>
+          <p:cNvPr id="3" name="TextBox 2">
+            <a:extLst>
+              <a:ext uri="{FF2B5EF4-FFF2-40B4-BE49-F238E27FC236}">
+                <a16:creationId xmlns:a16="http://schemas.microsoft.com/office/drawing/2014/main" id="{5379D1CF-9171-4F6F-AA24-C44140479540}"/>
+              </a:ext>
+            </a:extLst>
+          </p:cNvPr>
+          <p:cNvSpPr txBox="1"/>
+          <p:nvPr/>
+        </p:nvSpPr>
+        <p:spPr>
+          <a:xfrm>
+            <a:off x="534152" y="387412"/>
+            <a:ext cx="9588044" cy="892552"/>
+          </a:xfrm>
+          <a:prstGeom prst="rect">
+            <a:avLst/>
+          </a:prstGeom>
+          <a:noFill/>
+          <a:ln>
+            <a:solidFill>
+              <a:schemeClr val="accent1"/>
+            </a:solidFill>
+          </a:ln>
+        </p:spPr>
+        <p:txBody>
+          <a:bodyPr wrap="square" rtlCol="0">
+            <a:spAutoFit/>
+          </a:bodyPr>
+          <a:lstStyle/>
+          <a:p>
+            <a:r>
+              <a:rPr lang="en-US" sz="3600" b="1" dirty="0"/>
+              <a:t>Discussion (cont.): </a:t>
+            </a:r>
+            <a:r>
+              <a:rPr lang="en-US" sz="1600" b="1" dirty="0"/>
+              <a:t>Twitter Activity vs. Covid-19 Progression: Global Analysis </a:t>
+            </a:r>
+          </a:p>
+        </p:txBody>
+      </p:sp>
+      <p:sp>
+        <p:nvSpPr>
+          <p:cNvPr id="9" name="TextBox 8">
+            <a:extLst>
+              <a:ext uri="{FF2B5EF4-FFF2-40B4-BE49-F238E27FC236}">
+                <a16:creationId xmlns:a16="http://schemas.microsoft.com/office/drawing/2014/main" id="{ED4AF83A-ACBF-4FE0-8922-5FF013FE6807}"/>
+              </a:ext>
+            </a:extLst>
+          </p:cNvPr>
+          <p:cNvSpPr txBox="1"/>
+          <p:nvPr/>
+        </p:nvSpPr>
+        <p:spPr>
+          <a:xfrm>
+            <a:off x="451094" y="1322018"/>
+            <a:ext cx="10196623" cy="338554"/>
+          </a:xfrm>
+          <a:prstGeom prst="rect">
+            <a:avLst/>
+          </a:prstGeom>
+          <a:noFill/>
+        </p:spPr>
+        <p:txBody>
+          <a:bodyPr wrap="square" rtlCol="0">
+            <a:spAutoFit/>
+          </a:bodyPr>
+          <a:lstStyle/>
+          <a:p>
+            <a:r>
+              <a:rPr lang="en-US" sz="1600" b="1" dirty="0"/>
+              <a:t>Observations:</a:t>
+            </a:r>
+          </a:p>
+        </p:txBody>
+      </p:sp>
+      <p:sp>
+        <p:nvSpPr>
+          <p:cNvPr id="5" name="TextBox 4">
+            <a:extLst>
+              <a:ext uri="{FF2B5EF4-FFF2-40B4-BE49-F238E27FC236}">
+                <a16:creationId xmlns:a16="http://schemas.microsoft.com/office/drawing/2014/main" id="{BCCA9899-05A3-4774-B7EF-C5CDC8A001A5}"/>
+              </a:ext>
+            </a:extLst>
+          </p:cNvPr>
+          <p:cNvSpPr txBox="1"/>
+          <p:nvPr/>
+        </p:nvSpPr>
+        <p:spPr>
+          <a:xfrm>
+            <a:off x="621792" y="1792384"/>
+            <a:ext cx="10625328" cy="5232202"/>
+          </a:xfrm>
+          <a:prstGeom prst="rect">
+            <a:avLst/>
+          </a:prstGeom>
+          <a:noFill/>
+        </p:spPr>
+        <p:txBody>
+          <a:bodyPr wrap="square" rtlCol="0">
+            <a:spAutoFit/>
+          </a:bodyPr>
+          <a:lstStyle/>
+          <a:p>
+            <a:pPr marL="342900" indent="-342900">
+              <a:buAutoNum type="arabicParenR"/>
+            </a:pPr>
+            <a:r>
+              <a:rPr lang="en-US" sz="1600" dirty="0"/>
+              <a:t>During the early stages of the pandemic, Twitter data globally did not see a steady increase in original tweets as expected.  Instead, </a:t>
+            </a:r>
+            <a:r>
+              <a:rPr lang="en-US" sz="1600" dirty="0">
+                <a:effectLst/>
+              </a:rPr>
+              <a:t>higher numbers of original tweets occurred on days when there was major world headlines.  Clear examples occurred on January 31</a:t>
+            </a:r>
+            <a:r>
+              <a:rPr lang="en-US" sz="1600" baseline="30000" dirty="0">
+                <a:effectLst/>
+              </a:rPr>
+              <a:t>st</a:t>
+            </a:r>
+            <a:r>
+              <a:rPr lang="en-US" sz="1600" dirty="0">
+                <a:effectLst/>
+              </a:rPr>
+              <a:t> when the US announced travel restrictions for visitors returning from China and when the first quarantines were initiated.  Similar headline grabbing announcements occurred on February 9</a:t>
+            </a:r>
+            <a:r>
+              <a:rPr lang="en-US" sz="1600" baseline="30000" dirty="0">
+                <a:effectLst/>
+              </a:rPr>
+              <a:t>th</a:t>
+            </a:r>
+            <a:r>
+              <a:rPr lang="en-US" sz="1600" dirty="0">
+                <a:effectLst/>
+              </a:rPr>
+              <a:t>, 2020 (China investing10bn to fight the virus) and on February 21</a:t>
+            </a:r>
+            <a:r>
+              <a:rPr lang="en-US" sz="1600" baseline="30000" dirty="0">
+                <a:effectLst/>
+              </a:rPr>
+              <a:t>st</a:t>
+            </a:r>
+            <a:r>
+              <a:rPr lang="en-US" sz="1600" dirty="0">
+                <a:effectLst/>
+              </a:rPr>
+              <a:t> (WHO announced that Covid-19 was officially a pandemic). </a:t>
+            </a:r>
+          </a:p>
+          <a:p>
+            <a:r>
+              <a:rPr lang="en-US" sz="1600" dirty="0"/>
+              <a:t>	</a:t>
+            </a:r>
+          </a:p>
+          <a:p>
+            <a:r>
+              <a:rPr lang="en-US" sz="1600" dirty="0">
+                <a:effectLst/>
+              </a:rPr>
+              <a:t>		News cycles have significant impact on original tweets rather than sustained but increasing 			information such as what was experienced in the early part of the Covid-19 pandemic. </a:t>
+            </a:r>
+          </a:p>
+          <a:p>
+            <a:pPr marL="342900" indent="-342900">
+              <a:buAutoNum type="arabicParenR"/>
+            </a:pPr>
+            <a:endParaRPr lang="en-US" sz="1600" dirty="0"/>
+          </a:p>
+          <a:p>
+            <a:pPr marL="342900" indent="-342900">
+              <a:buAutoNum type="arabicParenR"/>
+            </a:pPr>
+            <a:endParaRPr lang="en-US" sz="1600" dirty="0">
+              <a:effectLst/>
+            </a:endParaRPr>
+          </a:p>
+          <a:p>
+            <a:r>
+              <a:rPr lang="en-US" sz="1600" dirty="0">
+                <a:effectLst/>
+              </a:rPr>
+              <a:t>2)	“Likes” and “Retweets” differed slightly.  There were still peaks on days which correlated to major headlines, but as 	the virus progressed,  “Likes” and “Retweets” reflected more stable forward progression as expected.  Also, the 	comparison between “Likes” and “Retweets” reflects that Twitter users are more inclined to like rather than retweet. </a:t>
+            </a:r>
+          </a:p>
+          <a:p>
+            <a:pPr marL="342900" indent="-342900">
+              <a:buFontTx/>
+              <a:buAutoNum type="arabicParenR"/>
+            </a:pPr>
+            <a:endParaRPr lang="en-US" sz="1600" dirty="0"/>
+          </a:p>
+          <a:p>
+            <a:r>
+              <a:rPr lang="en-US" sz="1600" dirty="0">
+                <a:effectLst/>
+              </a:rPr>
+              <a:t>		As awareness of a topic, like Covid-19, grows, Twitter users are more likely to be involved in that 		topic.  This corresponds to more tweet “Likes” and “Retweets.”</a:t>
+            </a:r>
+          </a:p>
+          <a:p>
+            <a:r>
+              <a:rPr lang="en-US" sz="1400" dirty="0">
+                <a:effectLst/>
+              </a:rPr>
+              <a:t> </a:t>
+            </a:r>
+          </a:p>
+          <a:p>
+            <a:pPr marL="342900" indent="-342900">
+              <a:buAutoNum type="arabicParenR"/>
+            </a:pPr>
+            <a:endParaRPr lang="en-US" sz="1400" dirty="0">
+              <a:effectLst/>
+            </a:endParaRPr>
+          </a:p>
+          <a:p>
+            <a:endParaRPr lang="en-US" dirty="0"/>
+          </a:p>
+        </p:txBody>
+      </p:sp>
+    </p:spTree>
+    <p:extLst>
+      <p:ext uri="{BB962C8B-B14F-4D97-AF65-F5344CB8AC3E}">
+        <p14:creationId xmlns:p14="http://schemas.microsoft.com/office/powerpoint/2010/main" val="1386029775"/>
       </p:ext>
     </p:extLst>
   </p:cSld>

</xml_diff>

<commit_message>
Additional revisions to presentation updated project proposal and findings document
</commit_message>
<xml_diff>
--- a/Cleaning/Data Analytics ProjectPres_LP_review.pptx
+++ b/Cleaning/Data Analytics ProjectPres_LP_review.pptx
@@ -7312,7 +7312,7 @@
         <p:spPr>
           <a:xfrm>
             <a:off x="254873" y="2359684"/>
-            <a:ext cx="4393325" cy="3046988"/>
+            <a:ext cx="4393325" cy="3908762"/>
           </a:xfrm>
           <a:prstGeom prst="rect">
             <a:avLst/>
@@ -7335,6 +7335,18 @@
               </a:rPr>
               <a:t> The data reflected that Mecklenburg County’s Covid-19 cases maintained a similar distribution to other North Carolina Metropolitan areas, however, they experienced a sharper increase in death rates. </a:t>
             </a:r>
+            <a:r>
+              <a:rPr lang="en-US" sz="1800" i="1" dirty="0">
+                <a:effectLst/>
+                <a:latin typeface="Century Gothic" panose="020B0502020202020204" pitchFamily="34" charset="0"/>
+                <a:ea typeface="Calibri" panose="020F0502020204030204" pitchFamily="34" charset="0"/>
+                <a:cs typeface="Times New Roman" panose="02020603050405020304" pitchFamily="18" charset="0"/>
+              </a:rPr>
+              <a:t>This differed from Wake county where Twitter activity declined, and Covid-19 cases and deaths were not as significant. </a:t>
+            </a:r>
+            <a:endParaRPr lang="en-US" sz="1600" dirty="0">
+              <a:effectLst/>
+            </a:endParaRPr>
           </a:p>
           <a:p>
             <a:endParaRPr lang="en-US" sz="1600" dirty="0"/>
@@ -7342,7 +7354,7 @@
           <a:p>
             <a:r>
               <a:rPr lang="en-US" sz="1600" dirty="0"/>
-              <a:t>The increase in death rates aligned with increased Twitter activity.  This behavior is aligned to the team’s hypothesis that Twitter activity increased as the pandemic progressed</a:t>
+              <a:t>The increase in death rates aligned with increased Twitter activity.  This behavior is aligned to the team’s hypothesis that Twitter activity increased as the pandemic progressed.</a:t>
             </a:r>
           </a:p>
         </p:txBody>
@@ -10216,7 +10228,7 @@
               <a:rPr lang="en-US" sz="1600" dirty="0">
                 <a:effectLst/>
               </a:rPr>
-              <a:t>higher numbers of original tweets occurred on days when there was major world headlines.  Clear examples occurred on January 31</a:t>
+              <a:t>higher numbers of original tweets occurred on days when there were major world headlines.  Clear examples occurred on January 31</a:t>
             </a:r>
             <a:r>
               <a:rPr lang="en-US" sz="1600" baseline="30000" dirty="0">

</xml_diff>